<commit_message>
Aktualisierung Präsentation: Manuel Schmitt
</commit_message>
<xml_diff>
--- a/Präsentationen/Zwischenpräsentation 16.06/Project proposal update 06.16 - Rift Wingsuit V2.pptx
+++ b/Präsentationen/Zwischenpräsentation 16.06/Project proposal update 06.16 - Rift Wingsuit V2.pptx
@@ -123,7 +123,7 @@
   </p:defaultTextStyle>
   <p:extLst>
     <p:ext uri="{EFAFB233-063F-42B5-8137-9DF3F51BA10A}">
-      <p15:sldGuideLst xmlns="" xmlns:p15="http://schemas.microsoft.com/office/powerpoint/2012/main">
+      <p15:sldGuideLst xmlns:p15="http://schemas.microsoft.com/office/powerpoint/2012/main" xmlns="">
         <p15:guide id="1" orient="horz" pos="1800">
           <p15:clr>
             <a:srgbClr val="A4A3A4"/>
@@ -223,7 +223,7 @@
             <a:fld id="{243825A9-FBEC-4183-9E10-7EA49C7B85FB}" type="datetimeFigureOut">
               <a:rPr lang="de-DE" smtClean="0"/>
               <a:pPr/>
-              <a:t>13.06.2016</a:t>
+              <a:t>15.06.2016</a:t>
             </a:fld>
             <a:endParaRPr lang="de-DE"/>
           </a:p>
@@ -393,7 +393,7 @@
     </p:spTree>
     <p:extLst>
       <p:ext uri="{BB962C8B-B14F-4D97-AF65-F5344CB8AC3E}">
-        <p14:creationId xmlns="" xmlns:p14="http://schemas.microsoft.com/office/powerpoint/2010/main" val="1727503161"/>
+        <p14:creationId xmlns:p14="http://schemas.microsoft.com/office/powerpoint/2010/main" xmlns="" val="1727503161"/>
       </p:ext>
     </p:extLst>
   </p:cSld>
@@ -578,7 +578,7 @@
     </p:spTree>
     <p:extLst>
       <p:ext uri="{BB962C8B-B14F-4D97-AF65-F5344CB8AC3E}">
-        <p14:creationId xmlns="" xmlns:p14="http://schemas.microsoft.com/office/powerpoint/2010/main" val="592270510"/>
+        <p14:creationId xmlns:p14="http://schemas.microsoft.com/office/powerpoint/2010/main" xmlns="" val="592270510"/>
       </p:ext>
     </p:extLst>
   </p:cSld>
@@ -762,7 +762,7 @@
             <a:fld id="{E3D2E8C1-5FD7-4691-AB68-D6297B4D5F43}" type="datetime1">
               <a:rPr lang="de-DE" smtClean="0"/>
               <a:pPr/>
-              <a:t>13.06.2016</a:t>
+              <a:t>15.06.2016</a:t>
             </a:fld>
             <a:endParaRPr lang="de-DE"/>
           </a:p>
@@ -929,7 +929,7 @@
             <a:fld id="{6555916C-EC3E-4A59-A202-E3BDAC789789}" type="datetime1">
               <a:rPr lang="de-DE" smtClean="0"/>
               <a:pPr/>
-              <a:t>13.06.2016</a:t>
+              <a:t>15.06.2016</a:t>
             </a:fld>
             <a:endParaRPr lang="de-DE"/>
           </a:p>
@@ -1106,7 +1106,7 @@
             <a:fld id="{B0BAAC96-984A-4C42-A65C-1E30F77A26C5}" type="datetime1">
               <a:rPr lang="de-DE" smtClean="0"/>
               <a:pPr/>
-              <a:t>13.06.2016</a:t>
+              <a:t>15.06.2016</a:t>
             </a:fld>
             <a:endParaRPr lang="de-DE"/>
           </a:p>
@@ -1273,7 +1273,7 @@
             <a:fld id="{0AF80EA2-653E-48EB-A275-D811A53BA918}" type="datetime1">
               <a:rPr lang="de-DE" smtClean="0"/>
               <a:pPr/>
-              <a:t>13.06.2016</a:t>
+              <a:t>15.06.2016</a:t>
             </a:fld>
             <a:endParaRPr lang="de-DE"/>
           </a:p>
@@ -1517,7 +1517,7 @@
             <a:fld id="{E5BD76EC-8BFC-4DBC-81BC-788FF00AD01A}" type="datetime1">
               <a:rPr lang="de-DE" smtClean="0"/>
               <a:pPr/>
-              <a:t>13.06.2016</a:t>
+              <a:t>15.06.2016</a:t>
             </a:fld>
             <a:endParaRPr lang="de-DE"/>
           </a:p>
@@ -1783,7 +1783,7 @@
             <a:fld id="{42D10058-B0DA-4CAD-91DA-40F8A0FB6522}" type="datetime1">
               <a:rPr lang="de-DE" smtClean="0"/>
               <a:pPr/>
-              <a:t>13.06.2016</a:t>
+              <a:t>15.06.2016</a:t>
             </a:fld>
             <a:endParaRPr lang="de-DE"/>
           </a:p>
@@ -2163,7 +2163,7 @@
             <a:fld id="{30F2673F-3B0B-4E2B-A302-85F12C63CE58}" type="datetime1">
               <a:rPr lang="de-DE" smtClean="0"/>
               <a:pPr/>
-              <a:t>13.06.2016</a:t>
+              <a:t>15.06.2016</a:t>
             </a:fld>
             <a:endParaRPr lang="de-DE"/>
           </a:p>
@@ -2315,7 +2315,7 @@
             <a:fld id="{99C24A88-FE37-415B-BBD5-612EBB0081EA}" type="datetime1">
               <a:rPr lang="de-DE" smtClean="0"/>
               <a:pPr/>
-              <a:t>13.06.2016</a:t>
+              <a:t>15.06.2016</a:t>
             </a:fld>
             <a:endParaRPr lang="de-DE"/>
           </a:p>
@@ -2407,7 +2407,7 @@
             <a:fld id="{D4BBCC0C-5DC1-47B9-9437-A552677B599E}" type="datetime1">
               <a:rPr lang="de-DE" smtClean="0"/>
               <a:pPr/>
-              <a:t>13.06.2016</a:t>
+              <a:t>15.06.2016</a:t>
             </a:fld>
             <a:endParaRPr lang="de-DE"/>
           </a:p>
@@ -2670,7 +2670,7 @@
             <a:fld id="{5D8961AA-03AC-4A6B-AD4E-C8A3670A08F8}" type="datetime1">
               <a:rPr lang="de-DE" smtClean="0"/>
               <a:pPr/>
-              <a:t>13.06.2016</a:t>
+              <a:t>15.06.2016</a:t>
             </a:fld>
             <a:endParaRPr lang="de-DE"/>
           </a:p>
@@ -2960,7 +2960,7 @@
             <a:fld id="{9565BAF1-4771-44D7-80BB-E70855042F1C}" type="datetime1">
               <a:rPr lang="de-DE" smtClean="0"/>
               <a:pPr/>
-              <a:t>13.06.2016</a:t>
+              <a:t>15.06.2016</a:t>
             </a:fld>
             <a:endParaRPr lang="de-DE"/>
           </a:p>
@@ -3733,7 +3733,7 @@
             <a:fld id="{48B16CC1-F4AA-4BAA-A083-6C6353824805}" type="datetime1">
               <a:rPr lang="de-DE" smtClean="0"/>
               <a:pPr/>
-              <a:t>13.06.2016</a:t>
+              <a:t>15.06.2016</a:t>
             </a:fld>
             <a:endParaRPr lang="de-DE"/>
           </a:p>
@@ -4721,6 +4721,13 @@
   <p:clrMapOvr>
     <a:masterClrMapping/>
   </p:clrMapOvr>
+  <p:timing>
+    <p:tnLst>
+      <p:par>
+        <p:cTn id="1" dur="indefinite" restart="never" nodeType="tmRoot"/>
+      </p:par>
+    </p:tnLst>
+  </p:timing>
 </p:sld>
 </file>
 
@@ -6569,7 +6576,7 @@
         </p:nvGraphicFramePr>
         <p:xfrm>
           <a:off x="179512" y="1201317"/>
-          <a:ext cx="8784978" cy="4116874"/>
+          <a:ext cx="8784978" cy="4206240"/>
         </p:xfrm>
         <a:graphic>
           <a:graphicData uri="http://schemas.openxmlformats.org/drawingml/2006/table">
@@ -6772,6 +6779,42 @@
                     <a:bodyPr/>
                     <a:lstStyle/>
                     <a:p>
+                      <a:pPr marL="0" marR="0" lvl="0" indent="0" algn="l" defTabSz="914400" rtl="0" eaLnBrk="1" fontAlgn="auto" latinLnBrk="0" hangingPunct="1">
+                        <a:lnSpc>
+                          <a:spcPct val="100000"/>
+                        </a:lnSpc>
+                        <a:spcBef>
+                          <a:spcPts val="0"/>
+                        </a:spcBef>
+                        <a:spcAft>
+                          <a:spcPts val="0"/>
+                        </a:spcAft>
+                        <a:buClrTx/>
+                        <a:buSzTx/>
+                        <a:buFont typeface="Arial" pitchFamily="34" charset="0"/>
+                        <a:buChar char="•"/>
+                        <a:tabLst/>
+                        <a:defRPr/>
+                      </a:pPr>
+                      <a:r>
+                        <a:rPr lang="de-DE" sz="1600" dirty="0" smtClean="0"/>
+                        <a:t> User </a:t>
+                      </a:r>
+                      <a:r>
+                        <a:rPr lang="de-DE" sz="1600" dirty="0" err="1" smtClean="0"/>
+                        <a:t>guide</a:t>
+                      </a:r>
+                      <a:r>
+                        <a:rPr lang="de-DE" sz="1600" baseline="0" dirty="0" smtClean="0"/>
+                        <a:t> </a:t>
+                      </a:r>
+                      <a:r>
+                        <a:rPr lang="de-DE" sz="1600" baseline="0" dirty="0" err="1" smtClean="0"/>
+                        <a:t>support</a:t>
+                      </a:r>
+                      <a:endParaRPr lang="de-DE" sz="1600" dirty="0" smtClean="0"/>
+                    </a:p>
+                    <a:p>
                       <a:endParaRPr lang="de-DE" dirty="0"/>
                     </a:p>
                   </a:txBody>
@@ -6944,48 +6987,64 @@
                     <a:bodyPr/>
                     <a:lstStyle/>
                     <a:p>
-                      <a:endParaRPr lang="de-DE"/>
-                    </a:p>
-                  </a:txBody>
-                  <a:tcPr/>
-                </a:tc>
-                <a:tc>
-                  <a:txBody>
-                    <a:bodyPr/>
-                    <a:lstStyle/>
-                    <a:p>
-                      <a:endParaRPr lang="de-DE"/>
-                    </a:p>
-                  </a:txBody>
-                  <a:tcPr/>
-                </a:tc>
-              </a:tr>
-              <a:tr h="825034">
-                <a:tc>
-                  <a:txBody>
-                    <a:bodyPr/>
-                    <a:lstStyle/>
-                    <a:p>
-                      <a:pPr algn="ctr"/>
-                      <a:r>
-                        <a:rPr lang="de-DE" sz="1600" dirty="0" smtClean="0"/>
-                        <a:t>08.16 – 24.08</a:t>
-                      </a:r>
-                      <a:endParaRPr lang="de-DE" sz="1600" dirty="0"/>
-                    </a:p>
-                  </a:txBody>
-                  <a:tcPr/>
-                </a:tc>
-                <a:tc>
-                  <a:txBody>
-                    <a:bodyPr/>
-                    <a:lstStyle/>
-                    <a:p>
                       <a:pPr>
                         <a:buFont typeface="Arial" pitchFamily="34" charset="0"/>
                         <a:buChar char="•"/>
                       </a:pPr>
                       <a:r>
+                        <a:rPr lang="en-US" sz="1600" dirty="0" smtClean="0"/>
+                        <a:t> </a:t>
+                      </a:r>
+                      <a:r>
+                        <a:rPr lang="en-US" sz="1600" dirty="0" err="1" smtClean="0"/>
+                        <a:t>Documen-tation</a:t>
+                      </a:r>
+                      <a:r>
+                        <a:rPr lang="en-US" sz="1600" baseline="0" dirty="0" smtClean="0"/>
+                        <a:t> support</a:t>
+                      </a:r>
+                      <a:endParaRPr lang="de-DE" sz="1600" dirty="0"/>
+                    </a:p>
+                  </a:txBody>
+                  <a:tcPr/>
+                </a:tc>
+                <a:tc>
+                  <a:txBody>
+                    <a:bodyPr/>
+                    <a:lstStyle/>
+                    <a:p>
+                      <a:endParaRPr lang="de-DE"/>
+                    </a:p>
+                  </a:txBody>
+                  <a:tcPr/>
+                </a:tc>
+              </a:tr>
+              <a:tr h="825034">
+                <a:tc>
+                  <a:txBody>
+                    <a:bodyPr/>
+                    <a:lstStyle/>
+                    <a:p>
+                      <a:pPr algn="ctr"/>
+                      <a:r>
+                        <a:rPr lang="de-DE" sz="1600" dirty="0" smtClean="0"/>
+                        <a:t>08.16 – 24.08</a:t>
+                      </a:r>
+                      <a:endParaRPr lang="de-DE" sz="1600" dirty="0"/>
+                    </a:p>
+                  </a:txBody>
+                  <a:tcPr/>
+                </a:tc>
+                <a:tc>
+                  <a:txBody>
+                    <a:bodyPr/>
+                    <a:lstStyle/>
+                    <a:p>
+                      <a:pPr>
+                        <a:buFont typeface="Arial" pitchFamily="34" charset="0"/>
+                        <a:buChar char="•"/>
+                      </a:pPr>
+                      <a:r>
                         <a:rPr lang="de-DE" sz="1600" dirty="0" smtClean="0"/>
                         <a:t> Client </a:t>
                       </a:r>
@@ -7030,6 +7089,58 @@
                   <a:txBody>
                     <a:bodyPr/>
                     <a:lstStyle/>
+                    <a:p>
+                      <a:pPr marL="0" marR="0" indent="0" algn="l" defTabSz="914400" rtl="0" eaLnBrk="1" fontAlgn="auto" latinLnBrk="0" hangingPunct="1">
+                        <a:lnSpc>
+                          <a:spcPct val="100000"/>
+                        </a:lnSpc>
+                        <a:spcBef>
+                          <a:spcPts val="0"/>
+                        </a:spcBef>
+                        <a:spcAft>
+                          <a:spcPts val="0"/>
+                        </a:spcAft>
+                        <a:buClrTx/>
+                        <a:buSzTx/>
+                        <a:buFont typeface="Arial" pitchFamily="34" charset="0"/>
+                        <a:buChar char="•"/>
+                        <a:tabLst/>
+                        <a:defRPr/>
+                      </a:pPr>
+                      <a:r>
+                        <a:rPr lang="de-DE" sz="1800" dirty="0" smtClean="0"/>
+                        <a:t> </a:t>
+                      </a:r>
+                      <a:r>
+                        <a:rPr lang="de-DE" sz="1600" dirty="0" err="1" smtClean="0"/>
+                        <a:t>Buffer</a:t>
+                      </a:r>
+                      <a:r>
+                        <a:rPr lang="de-DE" sz="1600" baseline="0" dirty="0" smtClean="0"/>
+                        <a:t> </a:t>
+                      </a:r>
+                      <a:r>
+                        <a:rPr lang="de-DE" sz="1600" baseline="0" dirty="0" err="1" smtClean="0"/>
+                        <a:t>for</a:t>
+                      </a:r>
+                      <a:r>
+                        <a:rPr lang="de-DE" sz="1600" baseline="0" dirty="0" smtClean="0"/>
+                        <a:t> </a:t>
+                      </a:r>
+                      <a:r>
+                        <a:rPr lang="de-DE" sz="1600" baseline="0" dirty="0" err="1" smtClean="0"/>
+                        <a:t>any</a:t>
+                      </a:r>
+                      <a:r>
+                        <a:rPr lang="de-DE" sz="1600" baseline="0" dirty="0" smtClean="0"/>
+                        <a:t> relevant </a:t>
+                      </a:r>
+                      <a:r>
+                        <a:rPr lang="de-DE" sz="1600" baseline="0" dirty="0" err="1" smtClean="0"/>
+                        <a:t>work</a:t>
+                      </a:r>
+                      <a:endParaRPr lang="de-DE" sz="1600" dirty="0" smtClean="0"/>
+                    </a:p>
                     <a:p>
                       <a:endParaRPr lang="de-DE" dirty="0"/>
                     </a:p>
@@ -7177,6 +7288,58 @@
                   <a:txBody>
                     <a:bodyPr/>
                     <a:lstStyle/>
+                    <a:p>
+                      <a:pPr marL="0" marR="0" indent="0" algn="l" defTabSz="914400" rtl="0" eaLnBrk="1" fontAlgn="auto" latinLnBrk="0" hangingPunct="1">
+                        <a:lnSpc>
+                          <a:spcPct val="100000"/>
+                        </a:lnSpc>
+                        <a:spcBef>
+                          <a:spcPts val="0"/>
+                        </a:spcBef>
+                        <a:spcAft>
+                          <a:spcPts val="0"/>
+                        </a:spcAft>
+                        <a:buClrTx/>
+                        <a:buSzTx/>
+                        <a:buFont typeface="Arial" pitchFamily="34" charset="0"/>
+                        <a:buChar char="•"/>
+                        <a:tabLst/>
+                        <a:defRPr/>
+                      </a:pPr>
+                      <a:r>
+                        <a:rPr lang="de-DE" sz="1800" dirty="0" smtClean="0"/>
+                        <a:t> </a:t>
+                      </a:r>
+                      <a:r>
+                        <a:rPr lang="de-DE" sz="1600" dirty="0" err="1" smtClean="0"/>
+                        <a:t>Buffer</a:t>
+                      </a:r>
+                      <a:r>
+                        <a:rPr lang="de-DE" sz="1600" baseline="0" dirty="0" smtClean="0"/>
+                        <a:t> </a:t>
+                      </a:r>
+                      <a:r>
+                        <a:rPr lang="de-DE" sz="1600" baseline="0" dirty="0" err="1" smtClean="0"/>
+                        <a:t>for</a:t>
+                      </a:r>
+                      <a:r>
+                        <a:rPr lang="de-DE" sz="1600" baseline="0" dirty="0" smtClean="0"/>
+                        <a:t> </a:t>
+                      </a:r>
+                      <a:r>
+                        <a:rPr lang="de-DE" sz="1600" baseline="0" dirty="0" err="1" smtClean="0"/>
+                        <a:t>any</a:t>
+                      </a:r>
+                      <a:r>
+                        <a:rPr lang="de-DE" sz="1600" baseline="0" dirty="0" smtClean="0"/>
+                        <a:t> relevant </a:t>
+                      </a:r>
+                      <a:r>
+                        <a:rPr lang="de-DE" sz="1600" baseline="0" dirty="0" err="1" smtClean="0"/>
+                        <a:t>work</a:t>
+                      </a:r>
+                      <a:endParaRPr lang="de-DE" sz="1600" dirty="0" smtClean="0"/>
+                    </a:p>
                     <a:p>
                       <a:endParaRPr lang="de-DE" dirty="0"/>
                     </a:p>
@@ -8133,6 +8296,13 @@
   <p:clrMapOvr>
     <a:masterClrMapping/>
   </p:clrMapOvr>
+  <p:timing>
+    <p:tnLst>
+      <p:par>
+        <p:cTn id="1" dur="indefinite" restart="never" nodeType="tmRoot"/>
+      </p:par>
+    </p:tnLst>
+  </p:timing>
 </p:sld>
 </file>
 
@@ -9710,7 +9880,11 @@
                         <a:t> </a:t>
                       </a:r>
                       <a:r>
-                        <a:rPr lang="en-US" sz="1600" dirty="0" smtClean="0"/>
+                        <a:rPr lang="en-US" sz="1600" dirty="0" smtClean="0">
+                          <a:solidFill>
+                            <a:srgbClr val="008000"/>
+                          </a:solidFill>
+                        </a:rPr>
                         <a:t>Working into the project and Unity Engine</a:t>
                       </a:r>
                     </a:p>
@@ -10042,66 +10216,130 @@
                         <a:t> </a:t>
                       </a:r>
                       <a:r>
-                        <a:rPr lang="de-DE" sz="1600" dirty="0" err="1" smtClean="0"/>
+                        <a:rPr lang="de-DE" sz="1600" dirty="0" err="1" smtClean="0">
+                          <a:solidFill>
+                            <a:srgbClr val="008000"/>
+                          </a:solidFill>
+                        </a:rPr>
                         <a:t>Creation</a:t>
                       </a:r>
                       <a:r>
-                        <a:rPr lang="de-DE" sz="1600" baseline="0" dirty="0" smtClean="0"/>
+                        <a:rPr lang="de-DE" sz="1600" baseline="0" dirty="0" smtClean="0">
+                          <a:solidFill>
+                            <a:srgbClr val="008000"/>
+                          </a:solidFill>
+                        </a:rPr>
                         <a:t> </a:t>
                       </a:r>
                       <a:r>
-                        <a:rPr lang="de-DE" sz="1600" baseline="0" dirty="0" err="1" smtClean="0"/>
+                        <a:rPr lang="de-DE" sz="1600" baseline="0" dirty="0" err="1" smtClean="0">
+                          <a:solidFill>
+                            <a:srgbClr val="008000"/>
+                          </a:solidFill>
+                        </a:rPr>
                         <a:t>of</a:t>
                       </a:r>
                       <a:r>
-                        <a:rPr lang="de-DE" sz="1600" baseline="0" dirty="0" smtClean="0"/>
+                        <a:rPr lang="de-DE" sz="1600" baseline="0" dirty="0" smtClean="0">
+                          <a:solidFill>
+                            <a:srgbClr val="008000"/>
+                          </a:solidFill>
+                        </a:rPr>
                         <a:t> post-</a:t>
                       </a:r>
                       <a:r>
-                        <a:rPr lang="de-DE" sz="1600" baseline="0" dirty="0" err="1" smtClean="0"/>
+                        <a:rPr lang="de-DE" sz="1600" baseline="0" dirty="0" err="1" smtClean="0">
+                          <a:solidFill>
+                            <a:srgbClr val="008000"/>
+                          </a:solidFill>
+                        </a:rPr>
                         <a:t>processing</a:t>
                       </a:r>
                       <a:r>
-                        <a:rPr lang="de-DE" sz="1600" baseline="0" dirty="0" smtClean="0"/>
+                        <a:rPr lang="de-DE" sz="1600" baseline="0" dirty="0" smtClean="0">
+                          <a:solidFill>
+                            <a:srgbClr val="008000"/>
+                          </a:solidFill>
+                        </a:rPr>
                         <a:t> </a:t>
                       </a:r>
                       <a:r>
-                        <a:rPr lang="de-DE" sz="1600" baseline="0" dirty="0" err="1" smtClean="0"/>
+                        <a:rPr lang="de-DE" sz="1600" baseline="0" dirty="0" err="1" smtClean="0">
+                          <a:solidFill>
+                            <a:srgbClr val="008000"/>
+                          </a:solidFill>
+                        </a:rPr>
                         <a:t>effects</a:t>
                       </a:r>
                       <a:r>
-                        <a:rPr lang="de-DE" sz="1600" baseline="0" dirty="0" smtClean="0"/>
+                        <a:rPr lang="de-DE" sz="1600" baseline="0" dirty="0" smtClean="0">
+                          <a:solidFill>
+                            <a:srgbClr val="008000"/>
+                          </a:solidFill>
+                        </a:rPr>
                         <a:t> </a:t>
                       </a:r>
                       <a:r>
-                        <a:rPr lang="de-DE" sz="1600" baseline="0" dirty="0" err="1" smtClean="0"/>
+                        <a:rPr lang="de-DE" sz="1600" baseline="0" dirty="0" err="1" smtClean="0">
+                          <a:solidFill>
+                            <a:srgbClr val="008000"/>
+                          </a:solidFill>
+                        </a:rPr>
                         <a:t>like</a:t>
                       </a:r>
                       <a:r>
-                        <a:rPr lang="de-DE" sz="1600" baseline="0" dirty="0" smtClean="0"/>
+                        <a:rPr lang="de-DE" sz="1600" baseline="0" dirty="0" smtClean="0">
+                          <a:solidFill>
+                            <a:srgbClr val="008000"/>
+                          </a:solidFill>
+                        </a:rPr>
                         <a:t> </a:t>
                       </a:r>
                       <a:r>
-                        <a:rPr lang="de-DE" sz="1600" baseline="0" dirty="0" err="1" smtClean="0"/>
+                        <a:rPr lang="de-DE" sz="1600" baseline="0" dirty="0" err="1" smtClean="0">
+                          <a:solidFill>
+                            <a:srgbClr val="008000"/>
+                          </a:solidFill>
+                        </a:rPr>
                         <a:t>bloom</a:t>
                       </a:r>
                       <a:r>
-                        <a:rPr lang="de-DE" sz="1600" baseline="0" dirty="0" smtClean="0"/>
+                        <a:rPr lang="de-DE" sz="1600" baseline="0" dirty="0" smtClean="0">
+                          <a:solidFill>
+                            <a:srgbClr val="008000"/>
+                          </a:solidFill>
+                        </a:rPr>
                         <a:t> </a:t>
                       </a:r>
                       <a:r>
-                        <a:rPr lang="de-DE" sz="1600" baseline="0" dirty="0" err="1" smtClean="0"/>
+                        <a:rPr lang="de-DE" sz="1600" baseline="0" dirty="0" err="1" smtClean="0">
+                          <a:solidFill>
+                            <a:srgbClr val="008000"/>
+                          </a:solidFill>
+                        </a:rPr>
                         <a:t>and</a:t>
                       </a:r>
                       <a:r>
-                        <a:rPr lang="de-DE" sz="1600" baseline="0" dirty="0" smtClean="0"/>
+                        <a:rPr lang="de-DE" sz="1600" baseline="0" dirty="0" smtClean="0">
+                          <a:solidFill>
+                            <a:srgbClr val="008000"/>
+                          </a:solidFill>
+                        </a:rPr>
                         <a:t> </a:t>
                       </a:r>
                       <a:r>
-                        <a:rPr lang="de-DE" sz="1600" baseline="0" dirty="0" err="1" smtClean="0"/>
+                        <a:rPr lang="de-DE" sz="1600" baseline="0" dirty="0" err="1" smtClean="0">
+                          <a:solidFill>
+                            <a:srgbClr val="008000"/>
+                          </a:solidFill>
+                        </a:rPr>
                         <a:t>blur</a:t>
                       </a:r>
-                      <a:endParaRPr lang="de-DE" sz="1600" dirty="0" smtClean="0"/>
+                      <a:endParaRPr lang="de-DE" sz="1600" dirty="0" smtClean="0">
+                        <a:solidFill>
+                          <a:srgbClr val="008000"/>
+                        </a:solidFill>
+                      </a:endParaRPr>
                     </a:p>
                   </a:txBody>
                   <a:tcPr/>
@@ -10443,14 +10681,26 @@
                         <a:t> </a:t>
                       </a:r>
                       <a:r>
-                        <a:rPr lang="en-US" sz="1600" dirty="0" smtClean="0"/>
+                        <a:rPr lang="en-US" sz="1600" dirty="0" smtClean="0">
+                          <a:solidFill>
+                            <a:srgbClr val="C00000"/>
+                          </a:solidFill>
+                        </a:rPr>
                         <a:t>Creation of ambient-occlusion-light</a:t>
                       </a:r>
                       <a:r>
-                        <a:rPr lang="en-US" sz="1600" baseline="0" dirty="0" smtClean="0"/>
+                        <a:rPr lang="en-US" sz="1600" baseline="0" dirty="0" smtClean="0">
+                          <a:solidFill>
+                            <a:srgbClr val="C00000"/>
+                          </a:solidFill>
+                        </a:rPr>
                         <a:t> -map</a:t>
                       </a:r>
-                      <a:endParaRPr lang="de-DE" sz="1600" dirty="0" smtClean="0"/>
+                      <a:endParaRPr lang="de-DE" sz="1600" dirty="0" smtClean="0">
+                        <a:solidFill>
+                          <a:srgbClr val="C00000"/>
+                        </a:solidFill>
+                      </a:endParaRPr>
                     </a:p>
                   </a:txBody>
                   <a:tcPr/>
@@ -10675,7 +10925,7 @@
         </p:nvGraphicFramePr>
         <p:xfrm>
           <a:off x="179512" y="1201316"/>
-          <a:ext cx="8784978" cy="3727506"/>
+          <a:ext cx="8784978" cy="4371908"/>
         </p:xfrm>
         <a:graphic>
           <a:graphicData uri="http://schemas.openxmlformats.org/drawingml/2006/table">
@@ -11007,7 +11257,39 @@
                     <a:bodyPr/>
                     <a:lstStyle/>
                     <a:p>
-                      <a:endParaRPr lang="de-DE" dirty="0"/>
+                      <a:pPr marL="0" marR="0" lvl="0" indent="0" algn="l" defTabSz="914400" rtl="0" eaLnBrk="1" fontAlgn="auto" latinLnBrk="0" hangingPunct="1">
+                        <a:lnSpc>
+                          <a:spcPct val="100000"/>
+                        </a:lnSpc>
+                        <a:spcBef>
+                          <a:spcPts val="0"/>
+                        </a:spcBef>
+                        <a:spcAft>
+                          <a:spcPts val="0"/>
+                        </a:spcAft>
+                        <a:buClrTx/>
+                        <a:buSzTx/>
+                        <a:buFont typeface="Arial" pitchFamily="34" charset="0"/>
+                        <a:buChar char="•"/>
+                        <a:tabLst/>
+                        <a:defRPr/>
+                      </a:pPr>
+                      <a:r>
+                        <a:rPr lang="de-DE" sz="1800" dirty="0" smtClean="0">
+                          <a:solidFill>
+                            <a:schemeClr val="tx1"/>
+                          </a:solidFill>
+                        </a:rPr>
+                        <a:t> </a:t>
+                      </a:r>
+                      <a:r>
+                        <a:rPr lang="en-US" sz="1600" dirty="0" smtClean="0">
+                          <a:solidFill>
+                            <a:schemeClr val="tx1"/>
+                          </a:solidFill>
+                        </a:rPr>
+                        <a:t>Working into the project and Unity Engine</a:t>
+                      </a:r>
                     </a:p>
                   </a:txBody>
                   <a:tcPr/>
@@ -11192,7 +11474,183 @@
                     <a:bodyPr/>
                     <a:lstStyle/>
                     <a:p>
-                      <a:endParaRPr lang="de-DE"/>
+                      <a:pPr>
+                        <a:buFont typeface="Arial" pitchFamily="34" charset="0"/>
+                        <a:buChar char="•"/>
+                      </a:pPr>
+                      <a:r>
+                        <a:rPr lang="de-DE" sz="1400" dirty="0" smtClean="0">
+                          <a:solidFill>
+                            <a:schemeClr val="tx1"/>
+                          </a:solidFill>
+                        </a:rPr>
+                        <a:t> </a:t>
+                      </a:r>
+                      <a:r>
+                        <a:rPr lang="de-DE" sz="1400" dirty="0" err="1" smtClean="0">
+                          <a:solidFill>
+                            <a:schemeClr val="tx1"/>
+                          </a:solidFill>
+                        </a:rPr>
+                        <a:t>Creation</a:t>
+                      </a:r>
+                      <a:r>
+                        <a:rPr lang="de-DE" sz="1400" baseline="0" dirty="0" smtClean="0">
+                          <a:solidFill>
+                            <a:schemeClr val="tx1"/>
+                          </a:solidFill>
+                        </a:rPr>
+                        <a:t> </a:t>
+                      </a:r>
+                      <a:r>
+                        <a:rPr lang="de-DE" sz="1400" baseline="0" dirty="0" err="1" smtClean="0">
+                          <a:solidFill>
+                            <a:schemeClr val="tx1"/>
+                          </a:solidFill>
+                        </a:rPr>
+                        <a:t>of</a:t>
+                      </a:r>
+                      <a:r>
+                        <a:rPr lang="de-DE" sz="1400" baseline="0" dirty="0" smtClean="0">
+                          <a:solidFill>
+                            <a:schemeClr val="tx1"/>
+                          </a:solidFill>
+                        </a:rPr>
+                        <a:t> post-</a:t>
+                      </a:r>
+                      <a:r>
+                        <a:rPr lang="de-DE" sz="1400" baseline="0" dirty="0" err="1" smtClean="0">
+                          <a:solidFill>
+                            <a:schemeClr val="tx1"/>
+                          </a:solidFill>
+                        </a:rPr>
+                        <a:t>processing</a:t>
+                      </a:r>
+                      <a:r>
+                        <a:rPr lang="de-DE" sz="1400" baseline="0" dirty="0" smtClean="0">
+                          <a:solidFill>
+                            <a:schemeClr val="tx1"/>
+                          </a:solidFill>
+                        </a:rPr>
+                        <a:t> </a:t>
+                      </a:r>
+                      <a:r>
+                        <a:rPr lang="de-DE" sz="1400" baseline="0" dirty="0" err="1" smtClean="0">
+                          <a:solidFill>
+                            <a:schemeClr val="tx1"/>
+                          </a:solidFill>
+                        </a:rPr>
+                        <a:t>effects</a:t>
+                      </a:r>
+                      <a:r>
+                        <a:rPr lang="de-DE" sz="1400" baseline="0" dirty="0" smtClean="0">
+                          <a:solidFill>
+                            <a:schemeClr val="tx1"/>
+                          </a:solidFill>
+                        </a:rPr>
+                        <a:t> </a:t>
+                      </a:r>
+                      <a:r>
+                        <a:rPr lang="de-DE" sz="1400" baseline="0" dirty="0" err="1" smtClean="0">
+                          <a:solidFill>
+                            <a:schemeClr val="tx1"/>
+                          </a:solidFill>
+                        </a:rPr>
+                        <a:t>like</a:t>
+                      </a:r>
+                      <a:r>
+                        <a:rPr lang="de-DE" sz="1400" baseline="0" dirty="0" smtClean="0">
+                          <a:solidFill>
+                            <a:schemeClr val="tx1"/>
+                          </a:solidFill>
+                        </a:rPr>
+                        <a:t> </a:t>
+                      </a:r>
+                      <a:r>
+                        <a:rPr lang="de-DE" sz="1400" baseline="0" dirty="0" err="1" smtClean="0">
+                          <a:solidFill>
+                            <a:schemeClr val="tx1"/>
+                          </a:solidFill>
+                        </a:rPr>
+                        <a:t>bloom</a:t>
+                      </a:r>
+                      <a:r>
+                        <a:rPr lang="de-DE" sz="1400" baseline="0" dirty="0" smtClean="0">
+                          <a:solidFill>
+                            <a:schemeClr val="tx1"/>
+                          </a:solidFill>
+                        </a:rPr>
+                        <a:t> </a:t>
+                      </a:r>
+                      <a:r>
+                        <a:rPr lang="de-DE" sz="1400" baseline="0" dirty="0" err="1" smtClean="0">
+                          <a:solidFill>
+                            <a:schemeClr val="tx1"/>
+                          </a:solidFill>
+                        </a:rPr>
+                        <a:t>and</a:t>
+                      </a:r>
+                      <a:r>
+                        <a:rPr lang="de-DE" sz="1400" baseline="0" dirty="0" smtClean="0">
+                          <a:solidFill>
+                            <a:schemeClr val="tx1"/>
+                          </a:solidFill>
+                        </a:rPr>
+                        <a:t> </a:t>
+                      </a:r>
+                      <a:r>
+                        <a:rPr lang="de-DE" sz="1400" baseline="0" dirty="0" err="1" smtClean="0">
+                          <a:solidFill>
+                            <a:schemeClr val="tx1"/>
+                          </a:solidFill>
+                        </a:rPr>
+                        <a:t>blur</a:t>
+                      </a:r>
+                      <a:r>
+                        <a:rPr lang="de-DE" sz="1400" baseline="0" dirty="0" smtClean="0">
+                          <a:solidFill>
+                            <a:schemeClr val="tx1"/>
+                          </a:solidFill>
+                        </a:rPr>
+                        <a:t> (</a:t>
+                      </a:r>
+                      <a:r>
+                        <a:rPr lang="de-DE" sz="1400" baseline="0" dirty="0" err="1" smtClean="0">
+                          <a:solidFill>
+                            <a:schemeClr val="tx1"/>
+                          </a:solidFill>
+                        </a:rPr>
+                        <a:t>sunshafts</a:t>
+                      </a:r>
+                      <a:r>
+                        <a:rPr lang="de-DE" sz="1400" baseline="0" dirty="0" smtClean="0">
+                          <a:solidFill>
+                            <a:schemeClr val="tx1"/>
+                          </a:solidFill>
+                        </a:rPr>
+                        <a:t>, </a:t>
+                      </a:r>
+                      <a:r>
+                        <a:rPr lang="de-DE" sz="1400" baseline="0" dirty="0" err="1" smtClean="0">
+                          <a:solidFill>
+                            <a:schemeClr val="tx1"/>
+                          </a:solidFill>
+                        </a:rPr>
+                        <a:t>vignette</a:t>
+                      </a:r>
+                      <a:r>
+                        <a:rPr lang="de-DE" sz="1400" baseline="0" dirty="0" smtClean="0">
+                          <a:solidFill>
+                            <a:schemeClr val="tx1"/>
+                          </a:solidFill>
+                        </a:rPr>
+                        <a:t>)</a:t>
+                      </a:r>
+                      <a:endParaRPr lang="de-DE" sz="1400" dirty="0">
+                        <a:solidFill>
+                          <a:schemeClr val="tx1"/>
+                        </a:solidFill>
+                      </a:endParaRPr>
                     </a:p>
                   </a:txBody>
                   <a:tcPr/>
@@ -11393,7 +11851,91 @@
                     <a:bodyPr/>
                     <a:lstStyle/>
                     <a:p>
-                      <a:endParaRPr lang="de-DE" dirty="0"/>
+                      <a:pPr>
+                        <a:buFont typeface="Arial" pitchFamily="34" charset="0"/>
+                        <a:buChar char="•"/>
+                      </a:pPr>
+                      <a:r>
+                        <a:rPr lang="de-DE" sz="1600" dirty="0" smtClean="0"/>
+                        <a:t> </a:t>
+                      </a:r>
+                      <a:r>
+                        <a:rPr lang="de-DE" sz="1400" dirty="0" smtClean="0"/>
+                        <a:t>Working</a:t>
+                      </a:r>
+                      <a:r>
+                        <a:rPr lang="de-DE" sz="1400" baseline="0" dirty="0" smtClean="0"/>
+                        <a:t> </a:t>
+                      </a:r>
+                      <a:r>
+                        <a:rPr lang="de-DE" sz="1400" baseline="0" dirty="0" err="1" smtClean="0"/>
+                        <a:t>into</a:t>
+                      </a:r>
+                      <a:r>
+                        <a:rPr lang="de-DE" sz="1400" baseline="0" dirty="0" smtClean="0"/>
+                        <a:t> </a:t>
+                      </a:r>
+                      <a:r>
+                        <a:rPr lang="de-DE" sz="1400" baseline="0" dirty="0" err="1" smtClean="0"/>
+                        <a:t>shader</a:t>
+                      </a:r>
+                      <a:r>
+                        <a:rPr lang="de-DE" sz="1400" baseline="0" dirty="0" smtClean="0"/>
+                        <a:t> </a:t>
+                      </a:r>
+                      <a:r>
+                        <a:rPr lang="de-DE" sz="1400" baseline="0" dirty="0" err="1" smtClean="0"/>
+                        <a:t>programming</a:t>
+                      </a:r>
+                      <a:r>
+                        <a:rPr lang="de-DE" sz="1400" baseline="0" dirty="0" smtClean="0"/>
+                        <a:t> </a:t>
+                      </a:r>
+                      <a:r>
+                        <a:rPr lang="de-DE" sz="1400" baseline="0" dirty="0" err="1" smtClean="0"/>
+                        <a:t>to</a:t>
+                      </a:r>
+                      <a:r>
+                        <a:rPr lang="de-DE" sz="1400" baseline="0" dirty="0" smtClean="0"/>
+                        <a:t> </a:t>
+                      </a:r>
+                      <a:r>
+                        <a:rPr lang="de-DE" sz="1400" baseline="0" dirty="0" err="1" smtClean="0"/>
+                        <a:t>create</a:t>
+                      </a:r>
+                      <a:r>
+                        <a:rPr lang="de-DE" sz="1400" baseline="0" dirty="0" smtClean="0"/>
+                        <a:t> </a:t>
+                      </a:r>
+                      <a:r>
+                        <a:rPr lang="de-DE" sz="1400" baseline="0" dirty="0" err="1" smtClean="0"/>
+                        <a:t>own</a:t>
+                      </a:r>
+                      <a:r>
+                        <a:rPr lang="de-DE" sz="1400" baseline="0" dirty="0" smtClean="0"/>
+                        <a:t> </a:t>
+                      </a:r>
+                      <a:r>
+                        <a:rPr lang="de-DE" sz="1400" baseline="0" dirty="0" err="1" smtClean="0"/>
+                        <a:t>shaders</a:t>
+                      </a:r>
+                      <a:r>
+                        <a:rPr lang="de-DE" sz="1400" baseline="0" dirty="0" smtClean="0"/>
+                        <a:t> </a:t>
+                      </a:r>
+                      <a:r>
+                        <a:rPr lang="de-DE" sz="1400" baseline="0" dirty="0" err="1" smtClean="0"/>
+                        <a:t>like</a:t>
+                      </a:r>
+                      <a:r>
+                        <a:rPr lang="de-DE" sz="1400" baseline="0" dirty="0" smtClean="0"/>
+                        <a:t> radial </a:t>
+                      </a:r>
+                      <a:r>
+                        <a:rPr lang="de-DE" sz="1400" baseline="0" dirty="0" err="1" smtClean="0"/>
+                        <a:t>blur</a:t>
+                      </a:r>
+                      <a:endParaRPr lang="de-DE" sz="1400" dirty="0"/>
                     </a:p>
                   </a:txBody>
                   <a:tcPr/>
@@ -11981,30 +12523,58 @@
                         <a:buChar char="•"/>
                       </a:pPr>
                       <a:r>
-                        <a:rPr lang="de-DE" sz="1600" baseline="0" dirty="0" smtClean="0"/>
+                        <a:rPr lang="de-DE" sz="1600" baseline="0" dirty="0" smtClean="0">
+                          <a:solidFill>
+                            <a:srgbClr val="C00000"/>
+                          </a:solidFill>
+                        </a:rPr>
                         <a:t> </a:t>
                       </a:r>
                       <a:r>
-                        <a:rPr lang="de-DE" sz="1600" baseline="0" dirty="0" err="1" smtClean="0"/>
+                        <a:rPr lang="de-DE" sz="1600" baseline="0" dirty="0" err="1" smtClean="0">
+                          <a:solidFill>
+                            <a:srgbClr val="C00000"/>
+                          </a:solidFill>
+                        </a:rPr>
                         <a:t>Buffer</a:t>
                       </a:r>
                       <a:r>
-                        <a:rPr lang="de-DE" sz="1600" baseline="0" dirty="0" smtClean="0"/>
+                        <a:rPr lang="de-DE" sz="1600" baseline="0" dirty="0" smtClean="0">
+                          <a:solidFill>
+                            <a:srgbClr val="C00000"/>
+                          </a:solidFill>
+                        </a:rPr>
                         <a:t> </a:t>
                       </a:r>
                       <a:r>
-                        <a:rPr lang="de-DE" sz="1600" baseline="0" dirty="0" err="1" smtClean="0"/>
+                        <a:rPr lang="de-DE" sz="1600" baseline="0" dirty="0" err="1" smtClean="0">
+                          <a:solidFill>
+                            <a:srgbClr val="C00000"/>
+                          </a:solidFill>
+                        </a:rPr>
                         <a:t>for</a:t>
                       </a:r>
                       <a:r>
-                        <a:rPr lang="de-DE" sz="1600" baseline="0" dirty="0" smtClean="0"/>
+                        <a:rPr lang="de-DE" sz="1600" baseline="0" dirty="0" smtClean="0">
+                          <a:solidFill>
+                            <a:srgbClr val="C00000"/>
+                          </a:solidFill>
+                        </a:rPr>
                         <a:t> </a:t>
                       </a:r>
                       <a:r>
-                        <a:rPr lang="de-DE" sz="1600" baseline="0" dirty="0" err="1" smtClean="0"/>
+                        <a:rPr lang="de-DE" sz="1600" baseline="0" dirty="0" err="1" smtClean="0">
+                          <a:solidFill>
+                            <a:srgbClr val="C00000"/>
+                          </a:solidFill>
+                        </a:rPr>
                         <a:t>ao</a:t>
                       </a:r>
-                      <a:endParaRPr lang="de-DE" sz="1600" baseline="0" dirty="0" smtClean="0"/>
+                      <a:endParaRPr lang="de-DE" sz="1600" baseline="0" dirty="0" smtClean="0">
+                        <a:solidFill>
+                          <a:srgbClr val="C00000"/>
+                        </a:solidFill>
+                      </a:endParaRPr>
                     </a:p>
                     <a:p>
                       <a:pPr lvl="0">
@@ -12012,46 +12582,90 @@
                         <a:buChar char="•"/>
                       </a:pPr>
                       <a:r>
-                        <a:rPr lang="de-DE" sz="1600" baseline="0" dirty="0" smtClean="0"/>
+                        <a:rPr lang="de-DE" sz="1600" baseline="0" dirty="0" smtClean="0">
+                          <a:solidFill>
+                            <a:srgbClr val="C00000"/>
+                          </a:solidFill>
+                        </a:rPr>
                         <a:t> </a:t>
                       </a:r>
                       <a:r>
-                        <a:rPr lang="de-DE" sz="1600" baseline="0" dirty="0" err="1" smtClean="0"/>
+                        <a:rPr lang="de-DE" sz="1600" baseline="0" dirty="0" err="1" smtClean="0">
+                          <a:solidFill>
+                            <a:srgbClr val="C00000"/>
+                          </a:solidFill>
+                        </a:rPr>
                         <a:t>God-rays</a:t>
                       </a:r>
                       <a:r>
-                        <a:rPr lang="de-DE" sz="1600" baseline="0" dirty="0" smtClean="0"/>
+                        <a:rPr lang="de-DE" sz="1600" baseline="0" dirty="0" smtClean="0">
+                          <a:solidFill>
+                            <a:srgbClr val="C00000"/>
+                          </a:solidFill>
+                        </a:rPr>
                         <a:t> </a:t>
                       </a:r>
                       <a:r>
-                        <a:rPr lang="de-DE" sz="1600" baseline="0" dirty="0" err="1" smtClean="0"/>
+                        <a:rPr lang="de-DE" sz="1600" baseline="0" dirty="0" err="1" smtClean="0">
+                          <a:solidFill>
+                            <a:srgbClr val="C00000"/>
+                          </a:solidFill>
+                        </a:rPr>
                         <a:t>and</a:t>
                       </a:r>
                       <a:r>
-                        <a:rPr lang="de-DE" sz="1600" baseline="0" dirty="0" smtClean="0"/>
+                        <a:rPr lang="de-DE" sz="1600" baseline="0" dirty="0" smtClean="0">
+                          <a:solidFill>
+                            <a:srgbClr val="C00000"/>
+                          </a:solidFill>
+                        </a:rPr>
                         <a:t>/</a:t>
                       </a:r>
                       <a:r>
-                        <a:rPr lang="de-DE" sz="1600" baseline="0" dirty="0" err="1" smtClean="0"/>
+                        <a:rPr lang="de-DE" sz="1600" baseline="0" dirty="0" err="1" smtClean="0">
+                          <a:solidFill>
+                            <a:srgbClr val="C00000"/>
+                          </a:solidFill>
+                        </a:rPr>
                         <a:t>or</a:t>
                       </a:r>
                       <a:r>
-                        <a:rPr lang="de-DE" sz="1600" baseline="0" dirty="0" smtClean="0"/>
+                        <a:rPr lang="de-DE" sz="1600" baseline="0" dirty="0" smtClean="0">
+                          <a:solidFill>
+                            <a:srgbClr val="C00000"/>
+                          </a:solidFill>
+                        </a:rPr>
                         <a:t>  </a:t>
                       </a:r>
                       <a:r>
-                        <a:rPr lang="de-DE" sz="1600" baseline="0" dirty="0" err="1" smtClean="0"/>
+                        <a:rPr lang="de-DE" sz="1600" baseline="0" dirty="0" err="1" smtClean="0">
+                          <a:solidFill>
+                            <a:srgbClr val="C00000"/>
+                          </a:solidFill>
+                        </a:rPr>
                         <a:t>atmos</a:t>
                       </a:r>
                       <a:r>
-                        <a:rPr lang="de-DE" sz="1600" baseline="0" dirty="0" smtClean="0"/>
+                        <a:rPr lang="de-DE" sz="1600" baseline="0" dirty="0" smtClean="0">
+                          <a:solidFill>
+                            <a:srgbClr val="C00000"/>
+                          </a:solidFill>
+                        </a:rPr>
                         <a:t>. </a:t>
                       </a:r>
                       <a:r>
-                        <a:rPr lang="de-DE" sz="1600" baseline="0" dirty="0" err="1" smtClean="0"/>
+                        <a:rPr lang="de-DE" sz="1600" baseline="0" dirty="0" err="1" smtClean="0">
+                          <a:solidFill>
+                            <a:srgbClr val="C00000"/>
+                          </a:solidFill>
+                        </a:rPr>
                         <a:t>scattering</a:t>
                       </a:r>
-                      <a:endParaRPr lang="de-DE" sz="1600" baseline="0" dirty="0" smtClean="0"/>
+                      <a:endParaRPr lang="de-DE" sz="1600" baseline="0" dirty="0" smtClean="0">
+                        <a:solidFill>
+                          <a:srgbClr val="C00000"/>
+                        </a:solidFill>
+                      </a:endParaRPr>
                     </a:p>
                   </a:txBody>
                   <a:tcPr/>
@@ -12466,21 +13080,45 @@
                       </a:pPr>
                       <a:r>
                         <a:rPr lang="de-DE" sz="1600" baseline="0" dirty="0" smtClean="0"/>
-                        <a:t> Client-</a:t>
-                      </a:r>
-                      <a:r>
-                        <a:rPr lang="de-DE" sz="1600" baseline="0" dirty="0" err="1" smtClean="0"/>
+                        <a:t> </a:t>
+                      </a:r>
+                      <a:r>
+                        <a:rPr lang="de-DE" sz="1600" baseline="0" dirty="0" smtClean="0">
+                          <a:solidFill>
+                            <a:srgbClr val="C00000"/>
+                          </a:solidFill>
+                        </a:rPr>
+                        <a:t>Client-</a:t>
+                      </a:r>
+                      <a:r>
+                        <a:rPr lang="de-DE" sz="1600" baseline="0" dirty="0" err="1" smtClean="0">
+                          <a:solidFill>
+                            <a:srgbClr val="C00000"/>
+                          </a:solidFill>
+                        </a:rPr>
                         <a:t>menu</a:t>
                       </a:r>
                       <a:r>
-                        <a:rPr lang="de-DE" sz="1600" baseline="0" dirty="0" smtClean="0"/>
+                        <a:rPr lang="de-DE" sz="1600" baseline="0" dirty="0" smtClean="0">
+                          <a:solidFill>
+                            <a:srgbClr val="C00000"/>
+                          </a:solidFill>
+                        </a:rPr>
                         <a:t>-</a:t>
                       </a:r>
                       <a:r>
-                        <a:rPr lang="de-DE" sz="1600" baseline="0" dirty="0" err="1" smtClean="0"/>
+                        <a:rPr lang="de-DE" sz="1600" baseline="0" dirty="0" err="1" smtClean="0">
+                          <a:solidFill>
+                            <a:srgbClr val="C00000"/>
+                          </a:solidFill>
+                        </a:rPr>
                         <a:t>structure</a:t>
                       </a:r>
-                      <a:endParaRPr lang="de-DE" sz="1600" baseline="0" dirty="0" smtClean="0"/>
+                      <a:endParaRPr lang="de-DE" sz="1600" baseline="0" dirty="0" smtClean="0">
+                        <a:solidFill>
+                          <a:srgbClr val="C00000"/>
+                        </a:solidFill>
+                      </a:endParaRPr>
                     </a:p>
                     <a:p>
                       <a:pPr marL="0" marR="0" lvl="0" indent="0" algn="l" defTabSz="914400" rtl="0" eaLnBrk="1" fontAlgn="auto" latinLnBrk="0" hangingPunct="1">
@@ -12501,22 +13139,42 @@
                         <a:defRPr/>
                       </a:pPr>
                       <a:r>
-                        <a:rPr lang="de-DE" sz="1600" baseline="0" dirty="0" smtClean="0"/>
+                        <a:rPr lang="de-DE" sz="1600" baseline="0" dirty="0" smtClean="0">
+                          <a:solidFill>
+                            <a:srgbClr val="C00000"/>
+                          </a:solidFill>
+                        </a:rPr>
                         <a:t> </a:t>
                       </a:r>
                       <a:r>
-                        <a:rPr lang="de-DE" sz="1600" baseline="0" dirty="0" err="1" smtClean="0"/>
+                        <a:rPr lang="de-DE" sz="1600" baseline="0" dirty="0" err="1" smtClean="0">
+                          <a:solidFill>
+                            <a:srgbClr val="C00000"/>
+                          </a:solidFill>
+                        </a:rPr>
                         <a:t>Menue</a:t>
                       </a:r>
                       <a:r>
-                        <a:rPr lang="de-DE" sz="1600" baseline="0" dirty="0" smtClean="0"/>
+                        <a:rPr lang="de-DE" sz="1600" baseline="0" dirty="0" smtClean="0">
+                          <a:solidFill>
+                            <a:srgbClr val="C00000"/>
+                          </a:solidFill>
+                        </a:rPr>
                         <a:t> </a:t>
                       </a:r>
                       <a:r>
-                        <a:rPr lang="de-DE" sz="1600" baseline="0" dirty="0" err="1" smtClean="0"/>
+                        <a:rPr lang="de-DE" sz="1600" baseline="0" dirty="0" err="1" smtClean="0">
+                          <a:solidFill>
+                            <a:srgbClr val="C00000"/>
+                          </a:solidFill>
+                        </a:rPr>
                         <a:t>functionality</a:t>
                       </a:r>
-                      <a:endParaRPr lang="de-DE" sz="1600" baseline="0" dirty="0" smtClean="0"/>
+                      <a:endParaRPr lang="de-DE" sz="1600" baseline="0" dirty="0" smtClean="0">
+                        <a:solidFill>
+                          <a:srgbClr val="C00000"/>
+                        </a:solidFill>
+                      </a:endParaRPr>
                     </a:p>
                   </a:txBody>
                   <a:tcPr/>
@@ -13088,7 +13746,7 @@
         </p:nvGraphicFramePr>
         <p:xfrm>
           <a:off x="179512" y="1201316"/>
-          <a:ext cx="8784978" cy="4019038"/>
+          <a:ext cx="8784978" cy="4450080"/>
         </p:xfrm>
         <a:graphic>
           <a:graphicData uri="http://schemas.openxmlformats.org/drawingml/2006/table">
@@ -13454,7 +14112,67 @@
                     <a:bodyPr/>
                     <a:lstStyle/>
                     <a:p>
-                      <a:endParaRPr lang="de-DE" dirty="0"/>
+                      <a:pPr>
+                        <a:buFont typeface="Arial" pitchFamily="34" charset="0"/>
+                        <a:buChar char="•"/>
+                      </a:pPr>
+                      <a:r>
+                        <a:rPr lang="de-DE" sz="1600" dirty="0" smtClean="0"/>
+                        <a:t>Working </a:t>
+                      </a:r>
+                      <a:r>
+                        <a:rPr lang="de-DE" sz="1600" dirty="0" err="1" smtClean="0"/>
+                        <a:t>into</a:t>
+                      </a:r>
+                      <a:r>
+                        <a:rPr lang="de-DE" sz="1600" dirty="0" smtClean="0"/>
+                        <a:t> </a:t>
+                      </a:r>
+                      <a:r>
+                        <a:rPr lang="de-DE" sz="1600" dirty="0" err="1" smtClean="0"/>
+                        <a:t>shaders</a:t>
+                      </a:r>
+                      <a:endParaRPr lang="de-DE" sz="1600" dirty="0" smtClean="0"/>
+                    </a:p>
+                    <a:p>
+                      <a:pPr>
+                        <a:buFont typeface="Arial" pitchFamily="34" charset="0"/>
+                        <a:buChar char="•"/>
+                      </a:pPr>
+                      <a:r>
+                        <a:rPr lang="de-DE" sz="1600" dirty="0" err="1" smtClean="0"/>
+                        <a:t>Testing</a:t>
+                      </a:r>
+                      <a:r>
+                        <a:rPr lang="de-DE" sz="1600" dirty="0" smtClean="0"/>
+                        <a:t> SSAO</a:t>
+                      </a:r>
+                    </a:p>
+                    <a:p>
+                      <a:pPr>
+                        <a:buFont typeface="Arial" pitchFamily="34" charset="0"/>
+                        <a:buChar char="•"/>
+                      </a:pPr>
+                      <a:r>
+                        <a:rPr lang="de-DE" sz="1600" dirty="0" err="1" smtClean="0"/>
+                        <a:t>Kinect</a:t>
+                      </a:r>
+                      <a:r>
+                        <a:rPr lang="de-DE" sz="1600" baseline="0" dirty="0" smtClean="0"/>
+                        <a:t> </a:t>
+                      </a:r>
+                      <a:r>
+                        <a:rPr lang="de-DE" sz="1600" baseline="0" dirty="0" err="1" smtClean="0"/>
+                        <a:t>tests</a:t>
+                      </a:r>
+                      <a:endParaRPr lang="de-DE" sz="1600" dirty="0" smtClean="0"/>
+                    </a:p>
+                    <a:p>
+                      <a:pPr>
+                        <a:buFont typeface="Arial" pitchFamily="34" charset="0"/>
+                        <a:buChar char="•"/>
+                      </a:pPr>
+                      <a:endParaRPr lang="de-DE" dirty="0" smtClean="0"/>
                     </a:p>
                   </a:txBody>
                   <a:tcPr/>
@@ -13621,7 +14339,57 @@
                     <a:bodyPr/>
                     <a:lstStyle/>
                     <a:p>
-                      <a:endParaRPr lang="de-DE"/>
+                      <a:pPr>
+                        <a:buFont typeface="Arial" pitchFamily="34" charset="0"/>
+                        <a:buChar char="•"/>
+                      </a:pPr>
+                      <a:r>
+                        <a:rPr lang="de-DE" sz="1400" dirty="0" smtClean="0"/>
+                        <a:t>Working </a:t>
+                      </a:r>
+                      <a:r>
+                        <a:rPr lang="de-DE" sz="1400" dirty="0" err="1" smtClean="0"/>
+                        <a:t>into</a:t>
+                      </a:r>
+                      <a:r>
+                        <a:rPr lang="de-DE" sz="1400" dirty="0" smtClean="0"/>
+                        <a:t> </a:t>
+                      </a:r>
+                      <a:r>
+                        <a:rPr lang="de-DE" sz="1400" dirty="0" err="1" smtClean="0"/>
+                        <a:t>shaders</a:t>
+                      </a:r>
+                      <a:endParaRPr lang="de-DE" sz="1400" dirty="0" smtClean="0"/>
+                    </a:p>
+                    <a:p>
+                      <a:pPr>
+                        <a:buFont typeface="Arial" pitchFamily="34" charset="0"/>
+                        <a:buChar char="•"/>
+                      </a:pPr>
+                      <a:r>
+                        <a:rPr lang="de-DE" sz="1400" dirty="0" err="1" smtClean="0"/>
+                        <a:t>Configuring</a:t>
+                      </a:r>
+                      <a:r>
+                        <a:rPr lang="de-DE" sz="1400" dirty="0" smtClean="0"/>
+                        <a:t> </a:t>
+                      </a:r>
+                      <a:r>
+                        <a:rPr lang="de-DE" sz="1400" dirty="0" err="1" smtClean="0"/>
+                        <a:t>spectator</a:t>
+                      </a:r>
+                      <a:r>
+                        <a:rPr lang="de-DE" sz="1400" baseline="0" dirty="0" smtClean="0"/>
+                        <a:t> </a:t>
+                      </a:r>
+                      <a:r>
+                        <a:rPr lang="de-DE" sz="1400" baseline="0" dirty="0" err="1" smtClean="0"/>
+                        <a:t>functions</a:t>
+                      </a:r>
+                      <a:endParaRPr lang="de-DE" sz="1400" dirty="0" smtClean="0"/>
+                    </a:p>
+                    <a:p>
+                      <a:endParaRPr lang="de-DE" dirty="0"/>
                     </a:p>
                   </a:txBody>
                   <a:tcPr/>
@@ -13814,6 +14582,56 @@
                   <a:txBody>
                     <a:bodyPr/>
                     <a:lstStyle/>
+                    <a:p>
+                      <a:pPr marL="0" marR="0" lvl="0" indent="0" algn="l" defTabSz="914400" rtl="0" eaLnBrk="1" fontAlgn="auto" latinLnBrk="0" hangingPunct="1">
+                        <a:lnSpc>
+                          <a:spcPct val="100000"/>
+                        </a:lnSpc>
+                        <a:spcBef>
+                          <a:spcPts val="0"/>
+                        </a:spcBef>
+                        <a:spcAft>
+                          <a:spcPts val="0"/>
+                        </a:spcAft>
+                        <a:buClrTx/>
+                        <a:buSzTx/>
+                        <a:buFont typeface="Arial" pitchFamily="34" charset="0"/>
+                        <a:buChar char="•"/>
+                        <a:tabLst/>
+                        <a:defRPr/>
+                      </a:pPr>
+                      <a:r>
+                        <a:rPr lang="de-DE" sz="1600" baseline="0" dirty="0" err="1" smtClean="0"/>
+                        <a:t>Menue</a:t>
+                      </a:r>
+                      <a:r>
+                        <a:rPr lang="de-DE" sz="1600" baseline="0" dirty="0" smtClean="0"/>
+                        <a:t> </a:t>
+                      </a:r>
+                      <a:r>
+                        <a:rPr lang="de-DE" sz="1600" baseline="0" dirty="0" err="1" smtClean="0"/>
+                        <a:t>funct</a:t>
+                      </a:r>
+                      <a:r>
+                        <a:rPr lang="de-DE" sz="1600" baseline="0" dirty="0" smtClean="0"/>
+                        <a:t>.</a:t>
+                      </a:r>
+                    </a:p>
+                    <a:p>
+                      <a:pPr>
+                        <a:buFont typeface="Arial" pitchFamily="34" charset="0"/>
+                        <a:buChar char="•"/>
+                      </a:pPr>
+                      <a:r>
+                        <a:rPr lang="de-DE" sz="1600" dirty="0" smtClean="0"/>
+                        <a:t> Gamepad </a:t>
+                      </a:r>
+                      <a:r>
+                        <a:rPr lang="de-DE" sz="1600" dirty="0" err="1" smtClean="0"/>
+                        <a:t>support</a:t>
+                      </a:r>
+                      <a:endParaRPr lang="de-DE" sz="1600" dirty="0" smtClean="0"/>
+                    </a:p>
                     <a:p>
                       <a:endParaRPr lang="de-DE" dirty="0"/>
                     </a:p>

</xml_diff>

<commit_message>
updated time table for sebastian
</commit_message>
<xml_diff>
--- a/Präsentationen/Zwischenpräsentation 16.06/Project proposal update 06.16 - Rift Wingsuit V2.pptx
+++ b/Präsentationen/Zwischenpräsentation 16.06/Project proposal update 06.16 - Rift Wingsuit V2.pptx
@@ -123,7 +123,7 @@
   </p:defaultTextStyle>
   <p:extLst>
     <p:ext uri="{EFAFB233-063F-42B5-8137-9DF3F51BA10A}">
-      <p15:sldGuideLst xmlns="" xmlns:p15="http://schemas.microsoft.com/office/powerpoint/2012/main">
+      <p15:sldGuideLst xmlns:p15="http://schemas.microsoft.com/office/powerpoint/2012/main">
         <p15:guide id="1" orient="horz" pos="1800">
           <p15:clr>
             <a:srgbClr val="A4A3A4"/>
@@ -223,7 +223,7 @@
             <a:fld id="{243825A9-FBEC-4183-9E10-7EA49C7B85FB}" type="datetimeFigureOut">
               <a:rPr lang="de-DE" smtClean="0"/>
               <a:pPr/>
-              <a:t>13.06.2016</a:t>
+              <a:t>15.06.2016</a:t>
             </a:fld>
             <a:endParaRPr lang="de-DE"/>
           </a:p>
@@ -393,7 +393,7 @@
     </p:spTree>
     <p:extLst>
       <p:ext uri="{BB962C8B-B14F-4D97-AF65-F5344CB8AC3E}">
-        <p14:creationId xmlns="" xmlns:p14="http://schemas.microsoft.com/office/powerpoint/2010/main" val="1727503161"/>
+        <p14:creationId xmlns:p14="http://schemas.microsoft.com/office/powerpoint/2010/main" val="1727503161"/>
       </p:ext>
     </p:extLst>
   </p:cSld>
@@ -578,7 +578,7 @@
     </p:spTree>
     <p:extLst>
       <p:ext uri="{BB962C8B-B14F-4D97-AF65-F5344CB8AC3E}">
-        <p14:creationId xmlns="" xmlns:p14="http://schemas.microsoft.com/office/powerpoint/2010/main" val="592270510"/>
+        <p14:creationId xmlns:p14="http://schemas.microsoft.com/office/powerpoint/2010/main" val="592270510"/>
       </p:ext>
     </p:extLst>
   </p:cSld>
@@ -762,7 +762,7 @@
             <a:fld id="{E3D2E8C1-5FD7-4691-AB68-D6297B4D5F43}" type="datetime1">
               <a:rPr lang="de-DE" smtClean="0"/>
               <a:pPr/>
-              <a:t>13.06.2016</a:t>
+              <a:t>15.06.2016</a:t>
             </a:fld>
             <a:endParaRPr lang="de-DE"/>
           </a:p>
@@ -929,7 +929,7 @@
             <a:fld id="{6555916C-EC3E-4A59-A202-E3BDAC789789}" type="datetime1">
               <a:rPr lang="de-DE" smtClean="0"/>
               <a:pPr/>
-              <a:t>13.06.2016</a:t>
+              <a:t>15.06.2016</a:t>
             </a:fld>
             <a:endParaRPr lang="de-DE"/>
           </a:p>
@@ -1106,7 +1106,7 @@
             <a:fld id="{B0BAAC96-984A-4C42-A65C-1E30F77A26C5}" type="datetime1">
               <a:rPr lang="de-DE" smtClean="0"/>
               <a:pPr/>
-              <a:t>13.06.2016</a:t>
+              <a:t>15.06.2016</a:t>
             </a:fld>
             <a:endParaRPr lang="de-DE"/>
           </a:p>
@@ -1273,7 +1273,7 @@
             <a:fld id="{0AF80EA2-653E-48EB-A275-D811A53BA918}" type="datetime1">
               <a:rPr lang="de-DE" smtClean="0"/>
               <a:pPr/>
-              <a:t>13.06.2016</a:t>
+              <a:t>15.06.2016</a:t>
             </a:fld>
             <a:endParaRPr lang="de-DE"/>
           </a:p>
@@ -1517,7 +1517,7 @@
             <a:fld id="{E5BD76EC-8BFC-4DBC-81BC-788FF00AD01A}" type="datetime1">
               <a:rPr lang="de-DE" smtClean="0"/>
               <a:pPr/>
-              <a:t>13.06.2016</a:t>
+              <a:t>15.06.2016</a:t>
             </a:fld>
             <a:endParaRPr lang="de-DE"/>
           </a:p>
@@ -1783,7 +1783,7 @@
             <a:fld id="{42D10058-B0DA-4CAD-91DA-40F8A0FB6522}" type="datetime1">
               <a:rPr lang="de-DE" smtClean="0"/>
               <a:pPr/>
-              <a:t>13.06.2016</a:t>
+              <a:t>15.06.2016</a:t>
             </a:fld>
             <a:endParaRPr lang="de-DE"/>
           </a:p>
@@ -2163,7 +2163,7 @@
             <a:fld id="{30F2673F-3B0B-4E2B-A302-85F12C63CE58}" type="datetime1">
               <a:rPr lang="de-DE" smtClean="0"/>
               <a:pPr/>
-              <a:t>13.06.2016</a:t>
+              <a:t>15.06.2016</a:t>
             </a:fld>
             <a:endParaRPr lang="de-DE"/>
           </a:p>
@@ -2315,7 +2315,7 @@
             <a:fld id="{99C24A88-FE37-415B-BBD5-612EBB0081EA}" type="datetime1">
               <a:rPr lang="de-DE" smtClean="0"/>
               <a:pPr/>
-              <a:t>13.06.2016</a:t>
+              <a:t>15.06.2016</a:t>
             </a:fld>
             <a:endParaRPr lang="de-DE"/>
           </a:p>
@@ -2407,7 +2407,7 @@
             <a:fld id="{D4BBCC0C-5DC1-47B9-9437-A552677B599E}" type="datetime1">
               <a:rPr lang="de-DE" smtClean="0"/>
               <a:pPr/>
-              <a:t>13.06.2016</a:t>
+              <a:t>15.06.2016</a:t>
             </a:fld>
             <a:endParaRPr lang="de-DE"/>
           </a:p>
@@ -2670,7 +2670,7 @@
             <a:fld id="{5D8961AA-03AC-4A6B-AD4E-C8A3670A08F8}" type="datetime1">
               <a:rPr lang="de-DE" smtClean="0"/>
               <a:pPr/>
-              <a:t>13.06.2016</a:t>
+              <a:t>15.06.2016</a:t>
             </a:fld>
             <a:endParaRPr lang="de-DE"/>
           </a:p>
@@ -2960,7 +2960,7 @@
             <a:fld id="{9565BAF1-4771-44D7-80BB-E70855042F1C}" type="datetime1">
               <a:rPr lang="de-DE" smtClean="0"/>
               <a:pPr/>
-              <a:t>13.06.2016</a:t>
+              <a:t>15.06.2016</a:t>
             </a:fld>
             <a:endParaRPr lang="de-DE"/>
           </a:p>
@@ -3733,7 +3733,7 @@
             <a:fld id="{48B16CC1-F4AA-4BAA-A083-6C6353824805}" type="datetime1">
               <a:rPr lang="de-DE" smtClean="0"/>
               <a:pPr/>
-              <a:t>13.06.2016</a:t>
+              <a:t>15.06.2016</a:t>
             </a:fld>
             <a:endParaRPr lang="de-DE"/>
           </a:p>
@@ -5064,7 +5064,13 @@
           <p:cNvGraphicFramePr>
             <a:graphicFrameLocks noGrp="1"/>
           </p:cNvGraphicFramePr>
-          <p:nvPr/>
+          <p:nvPr>
+            <p:extLst>
+              <p:ext uri="{D42A27DB-BD31-4B8C-83A1-F6EECF244321}">
+                <p14:modId xmlns:p14="http://schemas.microsoft.com/office/powerpoint/2010/main" val="4186651237"/>
+              </p:ext>
+            </p:extLst>
+          </p:nvPr>
         </p:nvGraphicFramePr>
         <p:xfrm>
           <a:off x="179512" y="1201317"/>
@@ -5270,14 +5276,26 @@
                         <a:t> </a:t>
                       </a:r>
                       <a:r>
-                        <a:rPr lang="en-US" sz="1600" dirty="0" smtClean="0"/>
+                        <a:rPr lang="en-US" sz="1600" dirty="0" smtClean="0">
+                          <a:solidFill>
+                            <a:srgbClr val="FF0000"/>
+                          </a:solidFill>
+                        </a:rPr>
                         <a:t>Evaluation</a:t>
                       </a:r>
                       <a:r>
-                        <a:rPr lang="en-US" sz="1600" baseline="0" dirty="0" smtClean="0"/>
+                        <a:rPr lang="en-US" sz="1600" baseline="0" dirty="0" smtClean="0">
+                          <a:solidFill>
+                            <a:srgbClr val="FF0000"/>
+                          </a:solidFill>
+                        </a:rPr>
                         <a:t> of open-source KinectV2 driver</a:t>
                       </a:r>
-                      <a:endParaRPr lang="de-DE" sz="1600" dirty="0" smtClean="0"/>
+                      <a:endParaRPr lang="de-DE" sz="1600" dirty="0" smtClean="0">
+                        <a:solidFill>
+                          <a:srgbClr val="FF0000"/>
+                        </a:solidFill>
+                      </a:endParaRPr>
                     </a:p>
                   </a:txBody>
                   <a:tcPr/>
@@ -6565,11 +6583,17 @@
           <p:cNvGraphicFramePr>
             <a:graphicFrameLocks noGrp="1"/>
           </p:cNvGraphicFramePr>
-          <p:nvPr/>
+          <p:nvPr>
+            <p:extLst>
+              <p:ext uri="{D42A27DB-BD31-4B8C-83A1-F6EECF244321}">
+                <p14:modId xmlns:p14="http://schemas.microsoft.com/office/powerpoint/2010/main" val="1745785134"/>
+              </p:ext>
+            </p:extLst>
+          </p:nvPr>
         </p:nvGraphicFramePr>
         <p:xfrm>
           <a:off x="179512" y="1201317"/>
-          <a:ext cx="8784978" cy="4116874"/>
+          <a:ext cx="8784978" cy="4602480"/>
         </p:xfrm>
         <a:graphic>
           <a:graphicData uri="http://schemas.openxmlformats.org/drawingml/2006/table">
@@ -6752,7 +6776,99 @@
                     <a:bodyPr/>
                     <a:lstStyle/>
                     <a:p>
-                      <a:endParaRPr lang="de-DE" dirty="0"/>
+                      <a:pPr marL="0" marR="0" lvl="1" indent="0" algn="l" defTabSz="914400" rtl="0" eaLnBrk="1" fontAlgn="auto" latinLnBrk="0" hangingPunct="1">
+                        <a:lnSpc>
+                          <a:spcPct val="100000"/>
+                        </a:lnSpc>
+                        <a:spcBef>
+                          <a:spcPts val="0"/>
+                        </a:spcBef>
+                        <a:spcAft>
+                          <a:spcPts val="0"/>
+                        </a:spcAft>
+                        <a:buClrTx/>
+                        <a:buSzTx/>
+                        <a:buFont typeface="Arial" pitchFamily="34" charset="0"/>
+                        <a:buChar char="•"/>
+                        <a:tabLst/>
+                        <a:defRPr/>
+                      </a:pPr>
+                      <a:r>
+                        <a:rPr lang="de-DE" sz="1600" baseline="0" dirty="0" err="1" smtClean="0"/>
+                        <a:t>Assisting</a:t>
+                      </a:r>
+                      <a:r>
+                        <a:rPr lang="de-DE" sz="1600" baseline="0" dirty="0" smtClean="0"/>
+                        <a:t> </a:t>
+                      </a:r>
+                      <a:r>
+                        <a:rPr lang="de-DE" sz="1600" baseline="0" dirty="0" err="1" smtClean="0"/>
+                        <a:t>with</a:t>
+                      </a:r>
+                      <a:r>
+                        <a:rPr lang="de-DE" sz="1600" baseline="0" dirty="0" smtClean="0"/>
+                        <a:t> </a:t>
+                      </a:r>
+                      <a:r>
+                        <a:rPr lang="de-DE" sz="1600" baseline="0" dirty="0" err="1" smtClean="0"/>
+                        <a:t>the</a:t>
+                      </a:r>
+                      <a:r>
+                        <a:rPr lang="de-DE" sz="1600" baseline="0" dirty="0" smtClean="0"/>
+                        <a:t> </a:t>
+                      </a:r>
+                      <a:r>
+                        <a:rPr lang="de-DE" sz="1600" baseline="0" dirty="0" err="1" smtClean="0"/>
+                        <a:t>menu</a:t>
+                      </a:r>
+                      <a:r>
+                        <a:rPr lang="de-DE" sz="1600" baseline="0" dirty="0" smtClean="0"/>
+                        <a:t> </a:t>
+                      </a:r>
+                      <a:r>
+                        <a:rPr lang="de-DE" sz="1600" baseline="0" dirty="0" err="1" smtClean="0"/>
+                        <a:t>struct</a:t>
+                      </a:r>
+                      <a:r>
+                        <a:rPr lang="de-DE" sz="1600" baseline="0" dirty="0" smtClean="0"/>
+                        <a:t>.</a:t>
+                      </a:r>
+                    </a:p>
+                    <a:p>
+                      <a:pPr marL="0" marR="0" lvl="1" indent="0" algn="l" defTabSz="914400" rtl="0" eaLnBrk="1" fontAlgn="auto" latinLnBrk="0" hangingPunct="1">
+                        <a:lnSpc>
+                          <a:spcPct val="100000"/>
+                        </a:lnSpc>
+                        <a:spcBef>
+                          <a:spcPts val="0"/>
+                        </a:spcBef>
+                        <a:spcAft>
+                          <a:spcPts val="0"/>
+                        </a:spcAft>
+                        <a:buClrTx/>
+                        <a:buSzTx/>
+                        <a:buFont typeface="Arial" pitchFamily="34" charset="0"/>
+                        <a:buChar char="•"/>
+                        <a:tabLst/>
+                        <a:defRPr/>
+                      </a:pPr>
+                      <a:r>
+                        <a:rPr lang="de-DE" sz="1600" baseline="0" dirty="0" smtClean="0"/>
+                        <a:t> e.g.: </a:t>
+                      </a:r>
+                      <a:r>
+                        <a:rPr lang="de-DE" sz="1600" baseline="0" dirty="0" err="1" smtClean="0"/>
+                        <a:t>possible</a:t>
+                      </a:r>
+                      <a:r>
+                        <a:rPr lang="de-DE" sz="1600" baseline="0" dirty="0" smtClean="0"/>
+                        <a:t> </a:t>
+                      </a:r>
+                      <a:r>
+                        <a:rPr lang="de-DE" sz="1600" baseline="0" dirty="0" err="1" smtClean="0"/>
+                        <a:t>improvements</a:t>
+                      </a:r>
+                      <a:endParaRPr lang="de-DE" sz="1600" baseline="0" dirty="0" smtClean="0"/>
                     </a:p>
                   </a:txBody>
                   <a:tcPr/>
@@ -6924,7 +7040,130 @@
                     <a:bodyPr/>
                     <a:lstStyle/>
                     <a:p>
-                      <a:endParaRPr lang="de-DE"/>
+                      <a:pPr marL="0" marR="0" lvl="1" indent="0" algn="l" defTabSz="914400" rtl="0" eaLnBrk="1" fontAlgn="auto" latinLnBrk="0" hangingPunct="1">
+                        <a:lnSpc>
+                          <a:spcPct val="100000"/>
+                        </a:lnSpc>
+                        <a:spcBef>
+                          <a:spcPts val="0"/>
+                        </a:spcBef>
+                        <a:spcAft>
+                          <a:spcPts val="0"/>
+                        </a:spcAft>
+                        <a:buClrTx/>
+                        <a:buSzTx/>
+                        <a:buFont typeface="Arial" pitchFamily="34" charset="0"/>
+                        <a:buChar char="•"/>
+                        <a:tabLst/>
+                        <a:defRPr/>
+                      </a:pPr>
+                      <a:r>
+                        <a:rPr kumimoji="0" lang="de-DE" sz="1600" kern="1200" baseline="0" dirty="0" smtClean="0">
+                          <a:solidFill>
+                            <a:schemeClr val="dk1"/>
+                          </a:solidFill>
+                          <a:latin typeface="+mn-lt"/>
+                          <a:ea typeface="+mn-ea"/>
+                          <a:cs typeface="+mn-cs"/>
+                        </a:rPr>
+                        <a:t> „The </a:t>
+                      </a:r>
+                      <a:r>
+                        <a:rPr kumimoji="0" lang="de-DE" sz="1600" kern="1200" baseline="0" dirty="0" err="1" smtClean="0">
+                          <a:solidFill>
+                            <a:schemeClr val="dk1"/>
+                          </a:solidFill>
+                          <a:latin typeface="+mn-lt"/>
+                          <a:ea typeface="+mn-ea"/>
+                          <a:cs typeface="+mn-cs"/>
+                        </a:rPr>
+                        <a:t>helping</a:t>
+                      </a:r>
+                      <a:r>
+                        <a:rPr kumimoji="0" lang="de-DE" sz="1600" kern="1200" baseline="0" dirty="0" smtClean="0">
+                          <a:solidFill>
+                            <a:schemeClr val="dk1"/>
+                          </a:solidFill>
+                          <a:latin typeface="+mn-lt"/>
+                          <a:ea typeface="+mn-ea"/>
+                          <a:cs typeface="+mn-cs"/>
+                        </a:rPr>
+                        <a:t> </a:t>
+                      </a:r>
+                      <a:r>
+                        <a:rPr kumimoji="0" lang="de-DE" sz="1600" kern="1200" baseline="0" dirty="0" err="1" smtClean="0">
+                          <a:solidFill>
+                            <a:schemeClr val="dk1"/>
+                          </a:solidFill>
+                          <a:latin typeface="+mn-lt"/>
+                          <a:ea typeface="+mn-ea"/>
+                          <a:cs typeface="+mn-cs"/>
+                        </a:rPr>
+                        <a:t>hand</a:t>
+                      </a:r>
+                      <a:r>
+                        <a:rPr kumimoji="0" lang="de-DE" sz="1600" kern="1200" baseline="0" dirty="0" smtClean="0">
+                          <a:solidFill>
+                            <a:schemeClr val="dk1"/>
+                          </a:solidFill>
+                          <a:latin typeface="+mn-lt"/>
+                          <a:ea typeface="+mn-ea"/>
+                          <a:cs typeface="+mn-cs"/>
+                        </a:rPr>
+                        <a:t> </a:t>
+                      </a:r>
+                      <a:r>
+                        <a:rPr kumimoji="0" lang="de-DE" sz="1600" kern="1200" baseline="0" dirty="0" err="1" smtClean="0">
+                          <a:solidFill>
+                            <a:schemeClr val="dk1"/>
+                          </a:solidFill>
+                          <a:latin typeface="+mn-lt"/>
+                          <a:ea typeface="+mn-ea"/>
+                          <a:cs typeface="+mn-cs"/>
+                        </a:rPr>
+                        <a:t>for</a:t>
+                      </a:r>
+                      <a:r>
+                        <a:rPr kumimoji="0" lang="de-DE" sz="1600" kern="1200" baseline="0" dirty="0" smtClean="0">
+                          <a:solidFill>
+                            <a:schemeClr val="dk1"/>
+                          </a:solidFill>
+                          <a:latin typeface="+mn-lt"/>
+                          <a:ea typeface="+mn-ea"/>
+                          <a:cs typeface="+mn-cs"/>
+                        </a:rPr>
+                        <a:t> </a:t>
+                      </a:r>
+                      <a:r>
+                        <a:rPr kumimoji="0" lang="de-DE" sz="1600" kern="1200" baseline="0" dirty="0" err="1" smtClean="0">
+                          <a:solidFill>
+                            <a:schemeClr val="dk1"/>
+                          </a:solidFill>
+                          <a:latin typeface="+mn-lt"/>
+                          <a:ea typeface="+mn-ea"/>
+                          <a:cs typeface="+mn-cs"/>
+                        </a:rPr>
+                        <a:t>emergencies</a:t>
+                      </a:r>
+                      <a:r>
+                        <a:rPr kumimoji="0" lang="de-DE" sz="1600" kern="1200" baseline="0" dirty="0" smtClean="0">
+                          <a:solidFill>
+                            <a:schemeClr val="dk1"/>
+                          </a:solidFill>
+                          <a:latin typeface="+mn-lt"/>
+                          <a:ea typeface="+mn-ea"/>
+                          <a:cs typeface="+mn-cs"/>
+                        </a:rPr>
+                        <a:t>“</a:t>
+                      </a:r>
+                      <a:endParaRPr kumimoji="0" lang="de-DE" sz="1600" kern="1200" dirty="0">
+                        <a:solidFill>
+                          <a:schemeClr val="dk1"/>
+                        </a:solidFill>
+                        <a:latin typeface="+mn-lt"/>
+                        <a:ea typeface="+mn-ea"/>
+                        <a:cs typeface="+mn-cs"/>
+                      </a:endParaRPr>
                     </a:p>
                   </a:txBody>
                   <a:tcPr/>
@@ -7011,7 +7250,103 @@
                     <a:bodyPr/>
                     <a:lstStyle/>
                     <a:p>
-                      <a:endParaRPr lang="de-DE" dirty="0"/>
+                      <a:pPr marL="0" marR="0" lvl="0" indent="-285750" algn="l" defTabSz="914400" rtl="0" eaLnBrk="1" fontAlgn="auto" latinLnBrk="0" hangingPunct="1">
+                        <a:lnSpc>
+                          <a:spcPct val="100000"/>
+                        </a:lnSpc>
+                        <a:spcBef>
+                          <a:spcPts val="0"/>
+                        </a:spcBef>
+                        <a:spcAft>
+                          <a:spcPts val="0"/>
+                        </a:spcAft>
+                        <a:buClrTx/>
+                        <a:buSzTx/>
+                        <a:buFont typeface="Arial" pitchFamily="34" charset="0"/>
+                        <a:buChar char="•"/>
+                        <a:tabLst/>
+                        <a:defRPr/>
+                      </a:pPr>
+                      <a:r>
+                        <a:rPr kumimoji="0" lang="de-DE" sz="1600" kern="1200" dirty="0" err="1" smtClean="0">
+                          <a:solidFill>
+                            <a:schemeClr val="dk1"/>
+                          </a:solidFill>
+                          <a:latin typeface="+mn-lt"/>
+                          <a:ea typeface="+mn-ea"/>
+                          <a:cs typeface="+mn-cs"/>
+                        </a:rPr>
+                        <a:t>Buffer</a:t>
+                      </a:r>
+                      <a:r>
+                        <a:rPr kumimoji="0" lang="de-DE" sz="1600" kern="1200" dirty="0" smtClean="0">
+                          <a:solidFill>
+                            <a:schemeClr val="dk1"/>
+                          </a:solidFill>
+                          <a:latin typeface="+mn-lt"/>
+                          <a:ea typeface="+mn-ea"/>
+                          <a:cs typeface="+mn-cs"/>
+                        </a:rPr>
+                        <a:t>; Overall </a:t>
+                      </a:r>
+                      <a:r>
+                        <a:rPr kumimoji="0" lang="de-DE" sz="1600" kern="1200" dirty="0" err="1" smtClean="0">
+                          <a:solidFill>
+                            <a:schemeClr val="dk1"/>
+                          </a:solidFill>
+                          <a:latin typeface="+mn-lt"/>
+                          <a:ea typeface="+mn-ea"/>
+                          <a:cs typeface="+mn-cs"/>
+                        </a:rPr>
+                        <a:t>testing</a:t>
+                      </a:r>
+                      <a:r>
+                        <a:rPr kumimoji="0" lang="de-DE" sz="1600" kern="1200" dirty="0" smtClean="0">
+                          <a:solidFill>
+                            <a:schemeClr val="dk1"/>
+                          </a:solidFill>
+                          <a:latin typeface="+mn-lt"/>
+                          <a:ea typeface="+mn-ea"/>
+                          <a:cs typeface="+mn-cs"/>
+                        </a:rPr>
+                        <a:t> („Bug </a:t>
+                      </a:r>
+                      <a:r>
+                        <a:rPr kumimoji="0" lang="de-DE" sz="1600" kern="1200" dirty="0" err="1" smtClean="0">
+                          <a:solidFill>
+                            <a:schemeClr val="dk1"/>
+                          </a:solidFill>
+                          <a:latin typeface="+mn-lt"/>
+                          <a:ea typeface="+mn-ea"/>
+                          <a:cs typeface="+mn-cs"/>
+                        </a:rPr>
+                        <a:t>hunting</a:t>
+                      </a:r>
+                      <a:r>
+                        <a:rPr kumimoji="0" lang="de-DE" sz="1600" kern="1200" dirty="0" smtClean="0">
+                          <a:solidFill>
+                            <a:schemeClr val="dk1"/>
+                          </a:solidFill>
+                          <a:latin typeface="+mn-lt"/>
+                          <a:ea typeface="+mn-ea"/>
+                          <a:cs typeface="+mn-cs"/>
+                        </a:rPr>
+                        <a:t>“)</a:t>
+                      </a:r>
+                    </a:p>
+                    <a:p>
+                      <a:pPr marL="0" lvl="0" indent="-285750" algn="l" rtl="0" eaLnBrk="1" latinLnBrk="0" hangingPunct="1">
+                        <a:buFont typeface="Arial" pitchFamily="34" charset="0"/>
+                        <a:buChar char="•"/>
+                      </a:pPr>
+                      <a:endParaRPr kumimoji="0" lang="de-DE" sz="1600" kern="1200" dirty="0">
+                        <a:solidFill>
+                          <a:schemeClr val="dk1"/>
+                        </a:solidFill>
+                        <a:latin typeface="+mn-lt"/>
+                        <a:ea typeface="+mn-ea"/>
+                        <a:cs typeface="+mn-cs"/>
+                      </a:endParaRPr>
                     </a:p>
                   </a:txBody>
                   <a:tcPr/>
@@ -7158,7 +7493,166 @@
                     <a:bodyPr/>
                     <a:lstStyle/>
                     <a:p>
-                      <a:endParaRPr lang="de-DE" dirty="0"/>
+                      <a:pPr marL="0" marR="0" lvl="0" indent="-285750" algn="l" defTabSz="914400" rtl="0" eaLnBrk="1" fontAlgn="auto" latinLnBrk="0" hangingPunct="1">
+                        <a:lnSpc>
+                          <a:spcPct val="100000"/>
+                        </a:lnSpc>
+                        <a:spcBef>
+                          <a:spcPts val="0"/>
+                        </a:spcBef>
+                        <a:spcAft>
+                          <a:spcPts val="0"/>
+                        </a:spcAft>
+                        <a:buClrTx/>
+                        <a:buSzTx/>
+                        <a:buFont typeface="Arial" pitchFamily="34" charset="0"/>
+                        <a:buChar char="•"/>
+                        <a:tabLst/>
+                        <a:defRPr/>
+                      </a:pPr>
+                      <a:r>
+                        <a:rPr kumimoji="0" lang="de-DE" sz="1600" kern="1200" dirty="0" smtClean="0">
+                          <a:solidFill>
+                            <a:schemeClr val="dk1"/>
+                          </a:solidFill>
+                          <a:latin typeface="+mn-lt"/>
+                          <a:ea typeface="+mn-ea"/>
+                          <a:cs typeface="+mn-cs"/>
+                        </a:rPr>
+                        <a:t> </a:t>
+                      </a:r>
+                      <a:r>
+                        <a:rPr kumimoji="0" lang="de-DE" sz="1600" kern="1200" dirty="0" err="1" smtClean="0">
+                          <a:solidFill>
+                            <a:schemeClr val="dk1"/>
+                          </a:solidFill>
+                          <a:latin typeface="+mn-lt"/>
+                          <a:ea typeface="+mn-ea"/>
+                          <a:cs typeface="+mn-cs"/>
+                        </a:rPr>
+                        <a:t>Buffer</a:t>
+                      </a:r>
+                      <a:r>
+                        <a:rPr kumimoji="0" lang="de-DE" sz="1600" kern="1200" dirty="0" smtClean="0">
+                          <a:solidFill>
+                            <a:schemeClr val="dk1"/>
+                          </a:solidFill>
+                          <a:latin typeface="+mn-lt"/>
+                          <a:ea typeface="+mn-ea"/>
+                          <a:cs typeface="+mn-cs"/>
+                        </a:rPr>
+                        <a:t> (</a:t>
+                      </a:r>
+                      <a:r>
+                        <a:rPr kumimoji="0" lang="de-DE" sz="1600" kern="1200" dirty="0" err="1" smtClean="0">
+                          <a:solidFill>
+                            <a:schemeClr val="dk1"/>
+                          </a:solidFill>
+                          <a:latin typeface="+mn-lt"/>
+                          <a:ea typeface="+mn-ea"/>
+                          <a:cs typeface="+mn-cs"/>
+                        </a:rPr>
+                        <a:t>fly</a:t>
+                      </a:r>
+                      <a:r>
+                        <a:rPr kumimoji="0" lang="de-DE" sz="1600" kern="1200" dirty="0" smtClean="0">
+                          <a:solidFill>
+                            <a:schemeClr val="dk1"/>
+                          </a:solidFill>
+                          <a:latin typeface="+mn-lt"/>
+                          <a:ea typeface="+mn-ea"/>
+                          <a:cs typeface="+mn-cs"/>
+                        </a:rPr>
+                        <a:t> </a:t>
+                      </a:r>
+                      <a:r>
+                        <a:rPr kumimoji="0" lang="de-DE" sz="1600" kern="1200" dirty="0" err="1" smtClean="0">
+                          <a:solidFill>
+                            <a:schemeClr val="dk1"/>
+                          </a:solidFill>
+                          <a:latin typeface="+mn-lt"/>
+                          <a:ea typeface="+mn-ea"/>
+                          <a:cs typeface="+mn-cs"/>
+                        </a:rPr>
+                        <a:t>physics</a:t>
+                      </a:r>
+                      <a:r>
+                        <a:rPr kumimoji="0" lang="de-DE" sz="1600" kern="1200" dirty="0" smtClean="0">
+                          <a:solidFill>
+                            <a:schemeClr val="dk1"/>
+                          </a:solidFill>
+                          <a:latin typeface="+mn-lt"/>
+                          <a:ea typeface="+mn-ea"/>
+                          <a:cs typeface="+mn-cs"/>
+                        </a:rPr>
+                        <a:t>, </a:t>
+                      </a:r>
+                      <a:r>
+                        <a:rPr kumimoji="0" lang="de-DE" sz="1600" kern="1200" dirty="0" err="1" smtClean="0">
+                          <a:solidFill>
+                            <a:schemeClr val="dk1"/>
+                          </a:solidFill>
+                          <a:latin typeface="+mn-lt"/>
+                          <a:ea typeface="+mn-ea"/>
+                          <a:cs typeface="+mn-cs"/>
+                        </a:rPr>
+                        <a:t>game</a:t>
+                      </a:r>
+                      <a:r>
+                        <a:rPr kumimoji="0" lang="de-DE" sz="1600" kern="1200" dirty="0" smtClean="0">
+                          <a:solidFill>
+                            <a:schemeClr val="dk1"/>
+                          </a:solidFill>
+                          <a:latin typeface="+mn-lt"/>
+                          <a:ea typeface="+mn-ea"/>
+                          <a:cs typeface="+mn-cs"/>
+                        </a:rPr>
+                        <a:t> </a:t>
+                      </a:r>
+                      <a:r>
+                        <a:rPr kumimoji="0" lang="de-DE" sz="1600" kern="1200" dirty="0" err="1" smtClean="0">
+                          <a:solidFill>
+                            <a:schemeClr val="dk1"/>
+                          </a:solidFill>
+                          <a:latin typeface="+mn-lt"/>
+                          <a:ea typeface="+mn-ea"/>
+                          <a:cs typeface="+mn-cs"/>
+                        </a:rPr>
+                        <a:t>logics</a:t>
+                      </a:r>
+                      <a:r>
+                        <a:rPr kumimoji="0" lang="de-DE" sz="1600" kern="1200" dirty="0" smtClean="0">
+                          <a:solidFill>
+                            <a:schemeClr val="dk1"/>
+                          </a:solidFill>
+                          <a:latin typeface="+mn-lt"/>
+                          <a:ea typeface="+mn-ea"/>
+                          <a:cs typeface="+mn-cs"/>
+                        </a:rPr>
+                        <a:t>, </a:t>
+                      </a:r>
+                      <a:r>
+                        <a:rPr kumimoji="0" lang="de-DE" sz="1600" kern="1200" dirty="0" err="1" smtClean="0">
+                          <a:solidFill>
+                            <a:schemeClr val="dk1"/>
+                          </a:solidFill>
+                          <a:latin typeface="+mn-lt"/>
+                          <a:ea typeface="+mn-ea"/>
+                          <a:cs typeface="+mn-cs"/>
+                        </a:rPr>
+                        <a:t>assistant</a:t>
+                      </a:r>
+                      <a:r>
+                        <a:rPr kumimoji="0" lang="de-DE" sz="1600" kern="1200" dirty="0" smtClean="0">
+                          <a:solidFill>
+                            <a:schemeClr val="dk1"/>
+                          </a:solidFill>
+                          <a:latin typeface="+mn-lt"/>
+                          <a:ea typeface="+mn-ea"/>
+                          <a:cs typeface="+mn-cs"/>
+                        </a:rPr>
+                        <a:t>)</a:t>
+                      </a:r>
                     </a:p>
                   </a:txBody>
                   <a:tcPr/>
@@ -9301,7 +9795,13 @@
           <p:cNvGraphicFramePr>
             <a:graphicFrameLocks noGrp="1"/>
           </p:cNvGraphicFramePr>
-          <p:nvPr/>
+          <p:nvPr>
+            <p:extLst>
+              <p:ext uri="{D42A27DB-BD31-4B8C-83A1-F6EECF244321}">
+                <p14:modId xmlns:p14="http://schemas.microsoft.com/office/powerpoint/2010/main" val="1963479039"/>
+              </p:ext>
+            </p:extLst>
+          </p:nvPr>
         </p:nvGraphicFramePr>
         <p:xfrm>
           <a:off x="179512" y="1201316"/>
@@ -9617,7 +10117,7 @@
                     <a:bodyPr/>
                     <a:lstStyle/>
                     <a:p>
-                      <a:pPr marL="0" marR="0" indent="0" algn="l" defTabSz="914400" rtl="0" eaLnBrk="1" fontAlgn="auto" latinLnBrk="0" hangingPunct="1">
+                      <a:pPr marL="0" marR="0" lvl="0" indent="-285750" algn="l" defTabSz="914400" rtl="0" eaLnBrk="1" fontAlgn="auto" latinLnBrk="0" hangingPunct="1">
                         <a:lnSpc>
                           <a:spcPct val="100000"/>
                         </a:lnSpc>
@@ -9635,22 +10135,57 @@
                         <a:defRPr/>
                       </a:pPr>
                       <a:r>
-                        <a:rPr lang="de-DE" sz="1600" baseline="0" dirty="0" smtClean="0"/>
+                        <a:rPr kumimoji="0" lang="de-DE" sz="1600" kern="1200" dirty="0" smtClean="0">
+                          <a:solidFill>
+                            <a:srgbClr val="008000"/>
+                          </a:solidFill>
+                          <a:latin typeface="+mn-lt"/>
+                          <a:ea typeface="+mn-ea"/>
+                          <a:cs typeface="+mn-cs"/>
+                        </a:rPr>
                         <a:t> Laws </a:t>
                       </a:r>
                       <a:r>
-                        <a:rPr lang="de-DE" sz="1600" baseline="0" dirty="0" err="1" smtClean="0"/>
+                        <a:rPr kumimoji="0" lang="de-DE" sz="1600" kern="1200" dirty="0" err="1" smtClean="0">
+                          <a:solidFill>
+                            <a:srgbClr val="008000"/>
+                          </a:solidFill>
+                          <a:latin typeface="+mn-lt"/>
+                          <a:ea typeface="+mn-ea"/>
+                          <a:cs typeface="+mn-cs"/>
+                        </a:rPr>
                         <a:t>of</a:t>
                       </a:r>
                       <a:r>
-                        <a:rPr lang="de-DE" sz="1600" baseline="0" dirty="0" smtClean="0"/>
+                        <a:rPr kumimoji="0" lang="de-DE" sz="1600" kern="1200" dirty="0" smtClean="0">
+                          <a:solidFill>
+                            <a:srgbClr val="008000"/>
+                          </a:solidFill>
+                          <a:latin typeface="+mn-lt"/>
+                          <a:ea typeface="+mn-ea"/>
+                          <a:cs typeface="+mn-cs"/>
+                        </a:rPr>
                         <a:t> </a:t>
                       </a:r>
                       <a:r>
-                        <a:rPr lang="de-DE" sz="1600" baseline="0" dirty="0" err="1" smtClean="0"/>
+                        <a:rPr kumimoji="0" lang="de-DE" sz="1600" kern="1200" dirty="0" err="1" smtClean="0">
+                          <a:solidFill>
+                            <a:srgbClr val="008000"/>
+                          </a:solidFill>
+                          <a:latin typeface="+mn-lt"/>
+                          <a:ea typeface="+mn-ea"/>
+                          <a:cs typeface="+mn-cs"/>
+                        </a:rPr>
                         <a:t>aerodynamics</a:t>
                       </a:r>
-                      <a:endParaRPr lang="de-DE" sz="1600" dirty="0" smtClean="0"/>
+                      <a:endParaRPr kumimoji="0" lang="de-DE" sz="1600" kern="1200" dirty="0" smtClean="0">
+                        <a:solidFill>
+                          <a:srgbClr val="008000"/>
+                        </a:solidFill>
+                        <a:latin typeface="+mn-lt"/>
+                        <a:ea typeface="+mn-ea"/>
+                        <a:cs typeface="+mn-cs"/>
+                      </a:endParaRPr>
                     </a:p>
                   </a:txBody>
                   <a:tcPr/>
@@ -9933,7 +10468,7 @@
                     <a:bodyPr/>
                     <a:lstStyle/>
                     <a:p>
-                      <a:pPr marL="0" marR="0" lvl="0" indent="0" algn="l" defTabSz="914400" rtl="0" eaLnBrk="1" fontAlgn="auto" latinLnBrk="0" hangingPunct="1">
+                      <a:pPr marL="0" marR="0" lvl="0" indent="-285750" algn="l" defTabSz="914400" rtl="0" eaLnBrk="1" fontAlgn="auto" latinLnBrk="0" hangingPunct="1">
                         <a:lnSpc>
                           <a:spcPct val="100000"/>
                         </a:lnSpc>
@@ -9951,21 +10486,101 @@
                         <a:defRPr/>
                       </a:pPr>
                       <a:r>
-                        <a:rPr lang="de-DE" sz="1600" dirty="0" smtClean="0"/>
-                        <a:t> F</a:t>
-                      </a:r>
-                      <a:r>
-                        <a:rPr lang="de-DE" sz="1600" baseline="0" dirty="0" smtClean="0"/>
-                        <a:t>irst </a:t>
-                      </a:r>
-                      <a:r>
-                        <a:rPr lang="de-DE" sz="1600" baseline="0" dirty="0" err="1" smtClean="0"/>
-                        <a:t>aerodynamic</a:t>
-                      </a:r>
-                      <a:r>
-                        <a:rPr lang="de-DE" sz="1600" baseline="0" dirty="0" smtClean="0"/>
-                        <a:t> (ad) model</a:t>
-                      </a:r>
+                        <a:rPr kumimoji="0" lang="de-DE" sz="1600" kern="1200" dirty="0" smtClean="0">
+                          <a:solidFill>
+                            <a:srgbClr val="008000"/>
+                          </a:solidFill>
+                          <a:latin typeface="+mn-lt"/>
+                          <a:ea typeface="+mn-ea"/>
+                          <a:cs typeface="+mn-cs"/>
+                        </a:rPr>
+                        <a:t> First </a:t>
+                      </a:r>
+                      <a:r>
+                        <a:rPr kumimoji="0" lang="de-DE" sz="1600" kern="1200" dirty="0" err="1" smtClean="0">
+                          <a:solidFill>
+                            <a:srgbClr val="008000"/>
+                          </a:solidFill>
+                          <a:latin typeface="+mn-lt"/>
+                          <a:ea typeface="+mn-ea"/>
+                          <a:cs typeface="+mn-cs"/>
+                        </a:rPr>
+                        <a:t>model</a:t>
+                      </a:r>
+                      <a:r>
+                        <a:rPr kumimoji="0" lang="de-DE" sz="1600" kern="1200" dirty="0" smtClean="0">
+                          <a:solidFill>
+                            <a:srgbClr val="008000"/>
+                          </a:solidFill>
+                          <a:latin typeface="+mn-lt"/>
+                          <a:ea typeface="+mn-ea"/>
+                          <a:cs typeface="+mn-cs"/>
+                        </a:rPr>
+                        <a:t> </a:t>
+                      </a:r>
+                      <a:r>
+                        <a:rPr kumimoji="0" lang="de-DE" sz="1600" kern="1200" dirty="0" err="1" smtClean="0">
+                          <a:solidFill>
+                            <a:srgbClr val="008000"/>
+                          </a:solidFill>
+                          <a:latin typeface="+mn-lt"/>
+                          <a:ea typeface="+mn-ea"/>
+                          <a:cs typeface="+mn-cs"/>
+                        </a:rPr>
+                        <a:t>based</a:t>
+                      </a:r>
+                      <a:r>
+                        <a:rPr kumimoji="0" lang="de-DE" sz="1600" kern="1200" dirty="0" smtClean="0">
+                          <a:solidFill>
+                            <a:srgbClr val="008000"/>
+                          </a:solidFill>
+                          <a:latin typeface="+mn-lt"/>
+                          <a:ea typeface="+mn-ea"/>
+                          <a:cs typeface="+mn-cs"/>
+                        </a:rPr>
+                        <a:t> on real </a:t>
+                      </a:r>
+                      <a:r>
+                        <a:rPr kumimoji="0" lang="de-DE" sz="1600" kern="1200" dirty="0" err="1" smtClean="0">
+                          <a:solidFill>
+                            <a:srgbClr val="008000"/>
+                          </a:solidFill>
+                          <a:latin typeface="+mn-lt"/>
+                          <a:ea typeface="+mn-ea"/>
+                          <a:cs typeface="+mn-cs"/>
+                        </a:rPr>
+                        <a:t>physic</a:t>
+                      </a:r>
+                      <a:r>
+                        <a:rPr kumimoji="0" lang="de-DE" sz="1600" kern="1200" dirty="0" smtClean="0">
+                          <a:solidFill>
+                            <a:srgbClr val="008000"/>
+                          </a:solidFill>
+                          <a:latin typeface="+mn-lt"/>
+                          <a:ea typeface="+mn-ea"/>
+                          <a:cs typeface="+mn-cs"/>
+                        </a:rPr>
+                        <a:t> </a:t>
+                      </a:r>
+                      <a:r>
+                        <a:rPr kumimoji="0" lang="de-DE" sz="1600" kern="1200" dirty="0" err="1" smtClean="0">
+                          <a:solidFill>
+                            <a:srgbClr val="008000"/>
+                          </a:solidFill>
+                          <a:latin typeface="+mn-lt"/>
+                          <a:ea typeface="+mn-ea"/>
+                          <a:cs typeface="+mn-cs"/>
+                        </a:rPr>
+                        <a:t>laws</a:t>
+                      </a:r>
+                      <a:endParaRPr kumimoji="0" lang="de-DE" sz="1600" kern="1200" dirty="0" smtClean="0">
+                        <a:solidFill>
+                          <a:srgbClr val="008000"/>
+                        </a:solidFill>
+                        <a:latin typeface="+mn-lt"/>
+                        <a:ea typeface="+mn-ea"/>
+                        <a:cs typeface="+mn-cs"/>
+                      </a:endParaRPr>
                     </a:p>
                   </a:txBody>
                   <a:tcPr/>
@@ -10336,7 +10951,7 @@
                     <a:bodyPr/>
                     <a:lstStyle/>
                     <a:p>
-                      <a:pPr marL="0" marR="0" lvl="0" indent="0" algn="l" defTabSz="914400" rtl="0" eaLnBrk="1" fontAlgn="auto" latinLnBrk="0" hangingPunct="1">
+                      <a:pPr marL="0" marR="0" lvl="0" indent="-285750" algn="l" defTabSz="914400" rtl="0" eaLnBrk="1" fontAlgn="auto" latinLnBrk="0" hangingPunct="1">
                         <a:lnSpc>
                           <a:spcPct val="100000"/>
                         </a:lnSpc>
@@ -10354,25 +10969,145 @@
                         <a:defRPr/>
                       </a:pPr>
                       <a:r>
-                        <a:rPr lang="de-DE" sz="1600" dirty="0" smtClean="0"/>
+                        <a:rPr kumimoji="0" lang="de-DE" sz="1600" kern="1200" dirty="0" smtClean="0">
+                          <a:solidFill>
+                            <a:srgbClr val="008000"/>
+                          </a:solidFill>
+                          <a:latin typeface="+mn-lt"/>
+                          <a:ea typeface="+mn-ea"/>
+                          <a:cs typeface="+mn-cs"/>
+                        </a:rPr>
                         <a:t> </a:t>
                       </a:r>
                       <a:r>
-                        <a:rPr lang="de-DE" sz="1600" dirty="0" err="1" smtClean="0"/>
-                        <a:t>Continue</a:t>
-                      </a:r>
-                      <a:r>
-                        <a:rPr lang="de-DE" sz="1600" dirty="0" smtClean="0"/>
+                        <a:rPr kumimoji="0" lang="de-DE" sz="1600" kern="1200" dirty="0" err="1" smtClean="0">
+                          <a:solidFill>
+                            <a:srgbClr val="008000"/>
+                          </a:solidFill>
+                          <a:latin typeface="+mn-lt"/>
+                          <a:ea typeface="+mn-ea"/>
+                          <a:cs typeface="+mn-cs"/>
+                        </a:rPr>
+                        <a:t>Continuing</a:t>
+                      </a:r>
+                      <a:r>
+                        <a:rPr kumimoji="0" lang="de-DE" sz="1600" kern="1200" dirty="0" smtClean="0">
+                          <a:solidFill>
+                            <a:srgbClr val="008000"/>
+                          </a:solidFill>
+                          <a:latin typeface="+mn-lt"/>
+                          <a:ea typeface="+mn-ea"/>
+                          <a:cs typeface="+mn-cs"/>
+                        </a:rPr>
                         <a:t> </a:t>
                       </a:r>
                       <a:r>
-                        <a:rPr lang="de-DE" sz="1600" dirty="0" err="1" smtClean="0"/>
+                        <a:rPr kumimoji="0" lang="de-DE" sz="1600" kern="1200" dirty="0" err="1" smtClean="0">
+                          <a:solidFill>
+                            <a:srgbClr val="008000"/>
+                          </a:solidFill>
+                          <a:latin typeface="+mn-lt"/>
+                          <a:ea typeface="+mn-ea"/>
+                          <a:cs typeface="+mn-cs"/>
+                        </a:rPr>
                         <a:t>work</a:t>
                       </a:r>
                       <a:r>
-                        <a:rPr lang="de-DE" sz="1600" dirty="0" smtClean="0"/>
-                        <a:t> ad. model</a:t>
-                      </a:r>
+                        <a:rPr kumimoji="0" lang="de-DE" sz="1600" kern="1200" dirty="0" smtClean="0">
+                          <a:solidFill>
+                            <a:srgbClr val="008000"/>
+                          </a:solidFill>
+                          <a:latin typeface="+mn-lt"/>
+                          <a:ea typeface="+mn-ea"/>
+                          <a:cs typeface="+mn-cs"/>
+                        </a:rPr>
+                        <a:t> on </a:t>
+                      </a:r>
+                      <a:r>
+                        <a:rPr kumimoji="0" lang="de-DE" sz="1600" kern="1200" dirty="0" err="1" smtClean="0">
+                          <a:solidFill>
+                            <a:srgbClr val="008000"/>
+                          </a:solidFill>
+                          <a:latin typeface="+mn-lt"/>
+                          <a:ea typeface="+mn-ea"/>
+                          <a:cs typeface="+mn-cs"/>
+                        </a:rPr>
+                        <a:t>the</a:t>
+                      </a:r>
+                      <a:r>
+                        <a:rPr kumimoji="0" lang="de-DE" sz="1600" kern="1200" dirty="0" smtClean="0">
+                          <a:solidFill>
+                            <a:srgbClr val="008000"/>
+                          </a:solidFill>
+                          <a:latin typeface="+mn-lt"/>
+                          <a:ea typeface="+mn-ea"/>
+                          <a:cs typeface="+mn-cs"/>
+                        </a:rPr>
+                        <a:t> </a:t>
+                      </a:r>
+                      <a:r>
+                        <a:rPr kumimoji="0" lang="de-DE" sz="1600" kern="1200" dirty="0" err="1" smtClean="0">
+                          <a:solidFill>
+                            <a:srgbClr val="008000"/>
+                          </a:solidFill>
+                          <a:latin typeface="+mn-lt"/>
+                          <a:ea typeface="+mn-ea"/>
+                          <a:cs typeface="+mn-cs"/>
+                        </a:rPr>
+                        <a:t>flying</a:t>
+                      </a:r>
+                      <a:r>
+                        <a:rPr kumimoji="0" lang="de-DE" sz="1600" kern="1200" dirty="0" smtClean="0">
+                          <a:solidFill>
+                            <a:srgbClr val="008000"/>
+                          </a:solidFill>
+                          <a:latin typeface="+mn-lt"/>
+                          <a:ea typeface="+mn-ea"/>
+                          <a:cs typeface="+mn-cs"/>
+                        </a:rPr>
+                        <a:t> </a:t>
+                      </a:r>
+                      <a:r>
+                        <a:rPr kumimoji="0" lang="de-DE" sz="1600" kern="1200" dirty="0" err="1" smtClean="0">
+                          <a:solidFill>
+                            <a:srgbClr val="008000"/>
+                          </a:solidFill>
+                          <a:latin typeface="+mn-lt"/>
+                          <a:ea typeface="+mn-ea"/>
+                          <a:cs typeface="+mn-cs"/>
+                        </a:rPr>
+                        <a:t>physics</a:t>
+                      </a:r>
+                      <a:r>
+                        <a:rPr kumimoji="0" lang="de-DE" sz="1600" kern="1200" dirty="0" smtClean="0">
+                          <a:solidFill>
+                            <a:srgbClr val="008000"/>
+                          </a:solidFill>
+                          <a:latin typeface="+mn-lt"/>
+                          <a:ea typeface="+mn-ea"/>
+                          <a:cs typeface="+mn-cs"/>
+                        </a:rPr>
+                        <a:t> </a:t>
+                      </a:r>
+                      <a:r>
+                        <a:rPr kumimoji="0" lang="de-DE" sz="1600" kern="1200" dirty="0" err="1" smtClean="0">
+                          <a:solidFill>
+                            <a:srgbClr val="008000"/>
+                          </a:solidFill>
+                          <a:latin typeface="+mn-lt"/>
+                          <a:ea typeface="+mn-ea"/>
+                          <a:cs typeface="+mn-cs"/>
+                        </a:rPr>
+                        <a:t>model</a:t>
+                      </a:r>
+                      <a:endParaRPr kumimoji="0" lang="de-DE" sz="1600" kern="1200" dirty="0" smtClean="0">
+                        <a:solidFill>
+                          <a:srgbClr val="008000"/>
+                        </a:solidFill>
+                        <a:latin typeface="+mn-lt"/>
+                        <a:ea typeface="+mn-ea"/>
+                        <a:cs typeface="+mn-cs"/>
+                      </a:endParaRPr>
                     </a:p>
                   </a:txBody>
                   <a:tcPr/>
@@ -10671,7 +11406,13 @@
           <p:cNvGraphicFramePr>
             <a:graphicFrameLocks noGrp="1"/>
           </p:cNvGraphicFramePr>
-          <p:nvPr/>
+          <p:nvPr>
+            <p:extLst>
+              <p:ext uri="{D42A27DB-BD31-4B8C-83A1-F6EECF244321}">
+                <p14:modId xmlns:p14="http://schemas.microsoft.com/office/powerpoint/2010/main" val="313239159"/>
+              </p:ext>
+            </p:extLst>
+          </p:nvPr>
         </p:nvGraphicFramePr>
         <p:xfrm>
           <a:off x="179512" y="1201316"/>
@@ -10987,7 +11728,40 @@
                     <a:bodyPr/>
                     <a:lstStyle/>
                     <a:p>
-                      <a:endParaRPr lang="de-DE" dirty="0"/>
+                      <a:pPr marL="0" marR="0" indent="0" algn="l" defTabSz="914400" rtl="0" eaLnBrk="1" fontAlgn="auto" latinLnBrk="0" hangingPunct="1">
+                        <a:lnSpc>
+                          <a:spcPct val="100000"/>
+                        </a:lnSpc>
+                        <a:spcBef>
+                          <a:spcPts val="0"/>
+                        </a:spcBef>
+                        <a:spcAft>
+                          <a:spcPts val="0"/>
+                        </a:spcAft>
+                        <a:buClrTx/>
+                        <a:buSzTx/>
+                        <a:buFont typeface="Arial" pitchFamily="34" charset="0"/>
+                        <a:buChar char="•"/>
+                        <a:tabLst/>
+                        <a:defRPr/>
+                      </a:pPr>
+                      <a:r>
+                        <a:rPr lang="de-DE" sz="1600" baseline="0" dirty="0" smtClean="0"/>
+                        <a:t> Laws </a:t>
+                      </a:r>
+                      <a:r>
+                        <a:rPr lang="de-DE" sz="1600" baseline="0" dirty="0" err="1" smtClean="0"/>
+                        <a:t>of</a:t>
+                      </a:r>
+                      <a:r>
+                        <a:rPr lang="de-DE" sz="1600" baseline="0" dirty="0" smtClean="0"/>
+                        <a:t> </a:t>
+                      </a:r>
+                      <a:r>
+                        <a:rPr lang="de-DE" sz="1600" baseline="0" dirty="0" err="1" smtClean="0"/>
+                        <a:t>aerodynamics</a:t>
+                      </a:r>
+                      <a:endParaRPr lang="de-DE" sz="1600" dirty="0" smtClean="0"/>
                     </a:p>
                   </a:txBody>
                   <a:tcPr/>
@@ -11172,7 +11946,64 @@
                     <a:bodyPr/>
                     <a:lstStyle/>
                     <a:p>
-                      <a:endParaRPr lang="de-DE"/>
+                      <a:pPr marL="0" marR="0" lvl="0" indent="0" algn="l" defTabSz="914400" rtl="0" eaLnBrk="1" fontAlgn="auto" latinLnBrk="0" hangingPunct="1">
+                        <a:lnSpc>
+                          <a:spcPct val="100000"/>
+                        </a:lnSpc>
+                        <a:spcBef>
+                          <a:spcPts val="0"/>
+                        </a:spcBef>
+                        <a:spcAft>
+                          <a:spcPts val="0"/>
+                        </a:spcAft>
+                        <a:buClrTx/>
+                        <a:buSzTx/>
+                        <a:buFont typeface="Arial" pitchFamily="34" charset="0"/>
+                        <a:buChar char="•"/>
+                        <a:tabLst/>
+                        <a:defRPr/>
+                      </a:pPr>
+                      <a:r>
+                        <a:rPr lang="de-DE" sz="1600" dirty="0" smtClean="0"/>
+                        <a:t> </a:t>
+                      </a:r>
+                      <a:r>
+                        <a:rPr lang="de-DE" sz="1600" dirty="0" smtClean="0"/>
+                        <a:t>F</a:t>
+                      </a:r>
+                      <a:r>
+                        <a:rPr lang="de-DE" sz="1600" baseline="0" dirty="0" smtClean="0"/>
+                        <a:t>irst </a:t>
+                      </a:r>
+                      <a:r>
+                        <a:rPr lang="de-DE" sz="1600" baseline="0" dirty="0" err="1" smtClean="0"/>
+                        <a:t>model</a:t>
+                      </a:r>
+                      <a:r>
+                        <a:rPr lang="de-DE" sz="1600" baseline="0" dirty="0" smtClean="0"/>
+                        <a:t> </a:t>
+                      </a:r>
+                      <a:r>
+                        <a:rPr lang="de-DE" sz="1600" baseline="0" dirty="0" err="1" smtClean="0"/>
+                        <a:t>based</a:t>
+                      </a:r>
+                      <a:r>
+                        <a:rPr lang="de-DE" sz="1600" baseline="0" dirty="0" smtClean="0"/>
+                        <a:t> on real </a:t>
+                      </a:r>
+                      <a:r>
+                        <a:rPr lang="de-DE" sz="1600" baseline="0" dirty="0" err="1" smtClean="0"/>
+                        <a:t>physic</a:t>
+                      </a:r>
+                      <a:r>
+                        <a:rPr lang="de-DE" sz="1600" baseline="0" dirty="0" smtClean="0"/>
+                        <a:t> </a:t>
+                      </a:r>
+                      <a:r>
+                        <a:rPr lang="de-DE" sz="1600" baseline="0" dirty="0" err="1" smtClean="0"/>
+                        <a:t>laws</a:t>
+                      </a:r>
+                      <a:endParaRPr lang="de-DE" sz="1600" baseline="0" dirty="0" smtClean="0"/>
                     </a:p>
                   </a:txBody>
                   <a:tcPr/>
@@ -11373,7 +12204,72 @@
                     <a:bodyPr/>
                     <a:lstStyle/>
                     <a:p>
-                      <a:endParaRPr lang="de-DE" dirty="0"/>
+                      <a:pPr marL="0" marR="0" lvl="0" indent="0" algn="l" defTabSz="914400" rtl="0" eaLnBrk="1" fontAlgn="auto" latinLnBrk="0" hangingPunct="1">
+                        <a:lnSpc>
+                          <a:spcPct val="100000"/>
+                        </a:lnSpc>
+                        <a:spcBef>
+                          <a:spcPts val="0"/>
+                        </a:spcBef>
+                        <a:spcAft>
+                          <a:spcPts val="0"/>
+                        </a:spcAft>
+                        <a:buClrTx/>
+                        <a:buSzTx/>
+                        <a:buFont typeface="Arial" pitchFamily="34" charset="0"/>
+                        <a:buChar char="•"/>
+                        <a:tabLst/>
+                        <a:defRPr/>
+                      </a:pPr>
+                      <a:r>
+                        <a:rPr lang="de-DE" sz="1600" dirty="0" smtClean="0"/>
+                        <a:t> </a:t>
+                      </a:r>
+                      <a:r>
+                        <a:rPr lang="de-DE" sz="1600" dirty="0" err="1" smtClean="0"/>
+                        <a:t>Continuing</a:t>
+                      </a:r>
+                      <a:r>
+                        <a:rPr lang="de-DE" sz="1600" baseline="0" dirty="0" smtClean="0"/>
+                        <a:t> </a:t>
+                      </a:r>
+                      <a:r>
+                        <a:rPr lang="de-DE" sz="1600" baseline="0" dirty="0" err="1" smtClean="0"/>
+                        <a:t>work</a:t>
+                      </a:r>
+                      <a:r>
+                        <a:rPr lang="de-DE" sz="1600" baseline="0" dirty="0" smtClean="0"/>
+                        <a:t> on </a:t>
+                      </a:r>
+                      <a:r>
+                        <a:rPr lang="de-DE" sz="1600" baseline="0" dirty="0" err="1" smtClean="0"/>
+                        <a:t>the</a:t>
+                      </a:r>
+                      <a:r>
+                        <a:rPr lang="de-DE" sz="1600" baseline="0" dirty="0" smtClean="0"/>
+                        <a:t> </a:t>
+                      </a:r>
+                      <a:r>
+                        <a:rPr lang="de-DE" sz="1600" baseline="0" dirty="0" err="1" smtClean="0"/>
+                        <a:t>flying</a:t>
+                      </a:r>
+                      <a:r>
+                        <a:rPr lang="de-DE" sz="1600" baseline="0" dirty="0" smtClean="0"/>
+                        <a:t> </a:t>
+                      </a:r>
+                      <a:r>
+                        <a:rPr lang="de-DE" sz="1600" baseline="0" dirty="0" err="1" smtClean="0"/>
+                        <a:t>physics</a:t>
+                      </a:r>
+                      <a:r>
+                        <a:rPr lang="de-DE" sz="1600" baseline="0" dirty="0" smtClean="0"/>
+                        <a:t> </a:t>
+                      </a:r>
+                      <a:r>
+                        <a:rPr lang="de-DE" sz="1600" baseline="0" dirty="0" err="1" smtClean="0"/>
+                        <a:t>model</a:t>
+                      </a:r>
+                      <a:endParaRPr lang="de-DE" sz="1600" dirty="0" smtClean="0"/>
                     </a:p>
                   </a:txBody>
                   <a:tcPr/>
@@ -11577,7 +12473,13 @@
           <p:cNvGraphicFramePr>
             <a:graphicFrameLocks noGrp="1"/>
           </p:cNvGraphicFramePr>
-          <p:nvPr/>
+          <p:nvPr>
+            <p:extLst>
+              <p:ext uri="{D42A27DB-BD31-4B8C-83A1-F6EECF244321}">
+                <p14:modId xmlns:p14="http://schemas.microsoft.com/office/powerpoint/2010/main" val="3925395150"/>
+              </p:ext>
+            </p:extLst>
+          </p:nvPr>
         </p:nvGraphicFramePr>
         <p:xfrm>
           <a:off x="179512" y="1201317"/>
@@ -11693,7 +12595,7 @@
                   <a:tcPr/>
                 </a:tc>
               </a:tr>
-              <a:tr h="1295775">
+              <a:tr h="1221079">
                 <a:tc>
                   <a:txBody>
                     <a:bodyPr/>
@@ -11888,6 +12790,79 @@
                     <a:bodyPr/>
                     <a:lstStyle/>
                     <a:p>
+                      <a:pPr marL="0" lvl="0" indent="-285750" algn="l" rtl="0" eaLnBrk="1" latinLnBrk="0" hangingPunct="1">
+                        <a:buFont typeface="Arial" pitchFamily="34" charset="0"/>
+                        <a:buChar char="•"/>
+                      </a:pPr>
+                      <a:r>
+                        <a:rPr lang="de-DE" sz="1600" baseline="0" dirty="0" smtClean="0"/>
+                        <a:t> </a:t>
+                      </a:r>
+                      <a:r>
+                        <a:rPr kumimoji="0" lang="de-DE" sz="1600" kern="1200" dirty="0" err="1" smtClean="0">
+                          <a:solidFill>
+                            <a:srgbClr val="008000"/>
+                          </a:solidFill>
+                          <a:latin typeface="+mn-lt"/>
+                          <a:ea typeface="+mn-ea"/>
+                          <a:cs typeface="+mn-cs"/>
+                        </a:rPr>
+                        <a:t>Improve</a:t>
+                      </a:r>
+                      <a:r>
+                        <a:rPr kumimoji="0" lang="de-DE" sz="1600" kern="1200" dirty="0" smtClean="0">
+                          <a:solidFill>
+                            <a:srgbClr val="008000"/>
+                          </a:solidFill>
+                          <a:latin typeface="+mn-lt"/>
+                          <a:ea typeface="+mn-ea"/>
+                          <a:cs typeface="+mn-cs"/>
+                        </a:rPr>
+                        <a:t> </a:t>
+                      </a:r>
+                      <a:r>
+                        <a:rPr kumimoji="0" lang="de-DE" sz="1600" kern="1200" dirty="0" err="1" smtClean="0">
+                          <a:solidFill>
+                            <a:srgbClr val="008000"/>
+                          </a:solidFill>
+                          <a:latin typeface="+mn-lt"/>
+                          <a:ea typeface="+mn-ea"/>
+                          <a:cs typeface="+mn-cs"/>
+                        </a:rPr>
+                        <a:t>fly-physics</a:t>
+                      </a:r>
+                      <a:r>
+                        <a:rPr kumimoji="0" lang="de-DE" sz="1600" kern="1200" dirty="0" smtClean="0">
+                          <a:solidFill>
+                            <a:srgbClr val="008000"/>
+                          </a:solidFill>
+                          <a:latin typeface="+mn-lt"/>
+                          <a:ea typeface="+mn-ea"/>
+                          <a:cs typeface="+mn-cs"/>
+                        </a:rPr>
+                        <a:t> </a:t>
+                      </a:r>
+                      <a:r>
+                        <a:rPr kumimoji="0" lang="de-DE" sz="1600" kern="1200" dirty="0" err="1" smtClean="0">
+                          <a:solidFill>
+                            <a:srgbClr val="008000"/>
+                          </a:solidFill>
+                          <a:latin typeface="+mn-lt"/>
+                          <a:ea typeface="+mn-ea"/>
+                          <a:cs typeface="+mn-cs"/>
+                        </a:rPr>
+                        <a:t>model</a:t>
+                      </a:r>
+                      <a:endParaRPr kumimoji="0" lang="de-DE" sz="1600" kern="1200" dirty="0" smtClean="0">
+                        <a:solidFill>
+                          <a:srgbClr val="008000"/>
+                        </a:solidFill>
+                        <a:latin typeface="+mn-lt"/>
+                        <a:ea typeface="+mn-ea"/>
+                        <a:cs typeface="+mn-cs"/>
+                      </a:endParaRPr>
+                    </a:p>
+                    <a:p>
                       <a:pPr lvl="0">
                         <a:buFont typeface="Arial" pitchFamily="34" charset="0"/>
                         <a:buChar char="•"/>
@@ -11897,33 +12872,26 @@
                         <a:t> </a:t>
                       </a:r>
                       <a:r>
-                        <a:rPr lang="de-DE" sz="1600" baseline="0" dirty="0" err="1" smtClean="0"/>
-                        <a:t>Increase</a:t>
-                      </a:r>
-                      <a:r>
-                        <a:rPr lang="de-DE" sz="1600" baseline="0" dirty="0" smtClean="0"/>
-                        <a:t> </a:t>
-                      </a:r>
-                      <a:r>
-                        <a:rPr lang="de-DE" sz="1600" baseline="0" dirty="0" err="1" smtClean="0"/>
-                        <a:t>flyphysics</a:t>
-                      </a:r>
-                      <a:endParaRPr lang="de-DE" sz="1600" baseline="0" dirty="0" smtClean="0"/>
-                    </a:p>
-                    <a:p>
-                      <a:pPr lvl="0">
-                        <a:buFont typeface="Arial" pitchFamily="34" charset="0"/>
-                        <a:buChar char="•"/>
-                      </a:pPr>
-                      <a:r>
-                        <a:rPr lang="de-DE" sz="1600" baseline="0" dirty="0" smtClean="0"/>
-                        <a:t> Error </a:t>
-                      </a:r>
-                      <a:r>
-                        <a:rPr lang="de-DE" sz="1600" baseline="0" dirty="0" err="1" smtClean="0"/>
+                        <a:rPr lang="de-DE" sz="1600" baseline="0" dirty="0" smtClean="0">
+                          <a:solidFill>
+                            <a:srgbClr val="FF0000"/>
+                          </a:solidFill>
+                        </a:rPr>
+                        <a:t>Error </a:t>
+                      </a:r>
+                      <a:r>
+                        <a:rPr lang="de-DE" sz="1600" baseline="0" dirty="0" err="1" smtClean="0">
+                          <a:solidFill>
+                            <a:srgbClr val="FF0000"/>
+                          </a:solidFill>
+                        </a:rPr>
                         <a:t>tolerance</a:t>
                       </a:r>
-                      <a:endParaRPr lang="de-DE" sz="1600" baseline="0" dirty="0" smtClean="0"/>
+                      <a:endParaRPr lang="de-DE" sz="1600" baseline="0" dirty="0" smtClean="0">
+                        <a:solidFill>
+                          <a:srgbClr val="FF0000"/>
+                        </a:solidFill>
+                      </a:endParaRPr>
                     </a:p>
                   </a:txBody>
                   <a:tcPr/>
@@ -12307,44 +13275,107 @@
                     <a:bodyPr/>
                     <a:lstStyle/>
                     <a:p>
-                      <a:pPr lvl="0">
+                      <a:pPr marL="0" lvl="0" indent="-285750" algn="l" rtl="0" eaLnBrk="1" latinLnBrk="0" hangingPunct="1">
                         <a:buFont typeface="Arial" pitchFamily="34" charset="0"/>
                         <a:buChar char="•"/>
                       </a:pPr>
                       <a:r>
-                        <a:rPr lang="de-DE" sz="1600" baseline="0" dirty="0" smtClean="0"/>
+                        <a:rPr kumimoji="0" lang="de-DE" sz="1600" kern="1200" dirty="0" smtClean="0">
+                          <a:solidFill>
+                            <a:srgbClr val="008000"/>
+                          </a:solidFill>
+                          <a:latin typeface="+mn-lt"/>
+                          <a:ea typeface="+mn-ea"/>
+                          <a:cs typeface="+mn-cs"/>
+                        </a:rPr>
                         <a:t>Add </a:t>
                       </a:r>
                       <a:r>
-                        <a:rPr lang="de-DE" sz="1600" baseline="0" dirty="0" err="1" smtClean="0"/>
+                        <a:rPr kumimoji="0" lang="de-DE" sz="1600" kern="1200" dirty="0" err="1" smtClean="0">
+                          <a:solidFill>
+                            <a:srgbClr val="008000"/>
+                          </a:solidFill>
+                          <a:latin typeface="+mn-lt"/>
+                          <a:ea typeface="+mn-ea"/>
+                          <a:cs typeface="+mn-cs"/>
+                        </a:rPr>
                         <a:t>configuratable</a:t>
                       </a:r>
                       <a:r>
-                        <a:rPr lang="de-DE" sz="1600" baseline="0" dirty="0" smtClean="0"/>
+                        <a:rPr kumimoji="0" lang="de-DE" sz="1600" kern="1200" dirty="0" smtClean="0">
+                          <a:solidFill>
+                            <a:srgbClr val="008000"/>
+                          </a:solidFill>
+                          <a:latin typeface="+mn-lt"/>
+                          <a:ea typeface="+mn-ea"/>
+                          <a:cs typeface="+mn-cs"/>
+                        </a:rPr>
                         <a:t> </a:t>
                       </a:r>
                       <a:r>
-                        <a:rPr lang="de-DE" sz="1600" baseline="0" dirty="0" err="1" smtClean="0"/>
+                        <a:rPr kumimoji="0" lang="de-DE" sz="1600" kern="1200" dirty="0" err="1" smtClean="0">
+                          <a:solidFill>
+                            <a:srgbClr val="008000"/>
+                          </a:solidFill>
+                          <a:latin typeface="+mn-lt"/>
+                          <a:ea typeface="+mn-ea"/>
+                          <a:cs typeface="+mn-cs"/>
+                        </a:rPr>
                         <a:t>properties</a:t>
                       </a:r>
                       <a:r>
-                        <a:rPr lang="de-DE" sz="1600" baseline="0" dirty="0" smtClean="0"/>
+                        <a:rPr kumimoji="0" lang="de-DE" sz="1600" kern="1200" dirty="0" smtClean="0">
+                          <a:solidFill>
+                            <a:srgbClr val="008000"/>
+                          </a:solidFill>
+                          <a:latin typeface="+mn-lt"/>
+                          <a:ea typeface="+mn-ea"/>
+                          <a:cs typeface="+mn-cs"/>
+                        </a:rPr>
                         <a:t> </a:t>
                       </a:r>
                       <a:r>
-                        <a:rPr lang="de-DE" sz="1600" baseline="0" dirty="0" err="1" smtClean="0"/>
+                        <a:rPr kumimoji="0" lang="de-DE" sz="1600" kern="1200" dirty="0" err="1" smtClean="0">
+                          <a:solidFill>
+                            <a:srgbClr val="008000"/>
+                          </a:solidFill>
+                          <a:latin typeface="+mn-lt"/>
+                          <a:ea typeface="+mn-ea"/>
+                          <a:cs typeface="+mn-cs"/>
+                        </a:rPr>
                         <a:t>to</a:t>
                       </a:r>
                       <a:r>
-                        <a:rPr lang="de-DE" sz="1600" baseline="0" dirty="0" smtClean="0"/>
+                        <a:rPr kumimoji="0" lang="de-DE" sz="1600" kern="1200" dirty="0" smtClean="0">
+                          <a:solidFill>
+                            <a:srgbClr val="008000"/>
+                          </a:solidFill>
+                          <a:latin typeface="+mn-lt"/>
+                          <a:ea typeface="+mn-ea"/>
+                          <a:cs typeface="+mn-cs"/>
+                        </a:rPr>
                         <a:t> </a:t>
                       </a:r>
                       <a:r>
-                        <a:rPr lang="de-DE" sz="1600" baseline="0" dirty="0" err="1" smtClean="0"/>
+                        <a:rPr kumimoji="0" lang="de-DE" sz="1600" kern="1200" dirty="0" err="1" smtClean="0">
+                          <a:solidFill>
+                            <a:srgbClr val="008000"/>
+                          </a:solidFill>
+                          <a:latin typeface="+mn-lt"/>
+                          <a:ea typeface="+mn-ea"/>
+                          <a:cs typeface="+mn-cs"/>
+                        </a:rPr>
                         <a:t>flying</a:t>
                       </a:r>
                       <a:r>
-                        <a:rPr lang="de-DE" sz="1600" baseline="0" dirty="0" smtClean="0"/>
+                        <a:rPr kumimoji="0" lang="de-DE" sz="1600" kern="1200" dirty="0" smtClean="0">
+                          <a:solidFill>
+                            <a:srgbClr val="008000"/>
+                          </a:solidFill>
+                          <a:latin typeface="+mn-lt"/>
+                          <a:ea typeface="+mn-ea"/>
+                          <a:cs typeface="+mn-cs"/>
+                        </a:rPr>
                         <a:t>-model</a:t>
                       </a:r>
                     </a:p>
@@ -13084,11 +14115,17 @@
           <p:cNvGraphicFramePr>
             <a:graphicFrameLocks noGrp="1"/>
           </p:cNvGraphicFramePr>
-          <p:nvPr/>
+          <p:nvPr>
+            <p:extLst>
+              <p:ext uri="{D42A27DB-BD31-4B8C-83A1-F6EECF244321}">
+                <p14:modId xmlns:p14="http://schemas.microsoft.com/office/powerpoint/2010/main" val="1934926722"/>
+              </p:ext>
+            </p:extLst>
+          </p:nvPr>
         </p:nvGraphicFramePr>
         <p:xfrm>
           <a:off x="179512" y="1201316"/>
-          <a:ext cx="8784978" cy="4019038"/>
+          <a:ext cx="8784978" cy="4573096"/>
         </p:xfrm>
         <a:graphic>
           <a:graphicData uri="http://schemas.openxmlformats.org/drawingml/2006/table">
@@ -13434,7 +14471,159 @@
                     <a:bodyPr/>
                     <a:lstStyle/>
                     <a:p>
-                      <a:endParaRPr lang="de-DE" dirty="0"/>
+                      <a:pPr lvl="0">
+                        <a:buFont typeface="Arial" pitchFamily="34" charset="0"/>
+                        <a:buChar char="•"/>
+                      </a:pPr>
+                      <a:r>
+                        <a:rPr lang="de-DE" sz="1600" dirty="0" smtClean="0">
+                          <a:solidFill>
+                            <a:schemeClr val="tx1"/>
+                          </a:solidFill>
+                        </a:rPr>
+                        <a:t> </a:t>
+                      </a:r>
+                      <a:r>
+                        <a:rPr lang="de-DE" sz="1600" dirty="0" err="1" smtClean="0">
+                          <a:solidFill>
+                            <a:schemeClr val="tx1"/>
+                          </a:solidFill>
+                        </a:rPr>
+                        <a:t>Improve</a:t>
+                      </a:r>
+                      <a:r>
+                        <a:rPr lang="de-DE" sz="1600" dirty="0" smtClean="0">
+                          <a:solidFill>
+                            <a:schemeClr val="tx1"/>
+                          </a:solidFill>
+                        </a:rPr>
+                        <a:t> </a:t>
+                      </a:r>
+                      <a:r>
+                        <a:rPr lang="de-DE" sz="1600" dirty="0" err="1" smtClean="0">
+                          <a:solidFill>
+                            <a:schemeClr val="tx1"/>
+                          </a:solidFill>
+                        </a:rPr>
+                        <a:t>fly-physics</a:t>
+                      </a:r>
+                      <a:r>
+                        <a:rPr lang="de-DE" sz="1600" baseline="0" dirty="0" smtClean="0">
+                          <a:solidFill>
+                            <a:schemeClr val="tx1"/>
+                          </a:solidFill>
+                        </a:rPr>
+                        <a:t> </a:t>
+                      </a:r>
+                      <a:r>
+                        <a:rPr lang="de-DE" sz="1600" dirty="0" err="1" smtClean="0">
+                          <a:solidFill>
+                            <a:schemeClr val="tx1"/>
+                          </a:solidFill>
+                        </a:rPr>
+                        <a:t>model</a:t>
+                      </a:r>
+                      <a:endParaRPr lang="de-DE" sz="1600" baseline="0" dirty="0" smtClean="0">
+                        <a:solidFill>
+                          <a:schemeClr val="tx1"/>
+                        </a:solidFill>
+                      </a:endParaRPr>
+                    </a:p>
+                    <a:p>
+                      <a:pPr marL="0" marR="0" lvl="0" indent="0" algn="l" defTabSz="914400" rtl="0" eaLnBrk="1" fontAlgn="auto" latinLnBrk="0" hangingPunct="1">
+                        <a:lnSpc>
+                          <a:spcPct val="100000"/>
+                        </a:lnSpc>
+                        <a:spcBef>
+                          <a:spcPts val="0"/>
+                        </a:spcBef>
+                        <a:spcAft>
+                          <a:spcPts val="0"/>
+                        </a:spcAft>
+                        <a:buClrTx/>
+                        <a:buSzTx/>
+                        <a:buFont typeface="Arial" pitchFamily="34" charset="0"/>
+                        <a:buChar char="•"/>
+                        <a:tabLst/>
+                        <a:defRPr/>
+                      </a:pPr>
+                      <a:r>
+                        <a:rPr lang="de-DE" sz="1600" baseline="0" dirty="0" err="1" smtClean="0">
+                          <a:solidFill>
+                            <a:schemeClr val="tx1"/>
+                          </a:solidFill>
+                        </a:rPr>
+                        <a:t>Configurable</a:t>
+                      </a:r>
+                      <a:endParaRPr lang="de-DE" sz="1600" baseline="0" dirty="0" smtClean="0">
+                        <a:solidFill>
+                          <a:schemeClr val="tx1"/>
+                        </a:solidFill>
+                      </a:endParaRPr>
+                    </a:p>
+                    <a:p>
+                      <a:pPr marL="0" marR="0" lvl="0" indent="0" algn="l" defTabSz="914400" rtl="0" eaLnBrk="1" fontAlgn="auto" latinLnBrk="0" hangingPunct="1">
+                        <a:lnSpc>
+                          <a:spcPct val="100000"/>
+                        </a:lnSpc>
+                        <a:spcBef>
+                          <a:spcPts val="0"/>
+                        </a:spcBef>
+                        <a:spcAft>
+                          <a:spcPts val="0"/>
+                        </a:spcAft>
+                        <a:buClrTx/>
+                        <a:buSzTx/>
+                        <a:buFont typeface="Arial" pitchFamily="34" charset="0"/>
+                        <a:buChar char="•"/>
+                        <a:tabLst/>
+                        <a:defRPr/>
+                      </a:pPr>
+                      <a:r>
+                        <a:rPr lang="de-DE" sz="1800" baseline="0" dirty="0" err="1" smtClean="0">
+                          <a:solidFill>
+                            <a:schemeClr val="tx1"/>
+                          </a:solidFill>
+                        </a:rPr>
+                        <a:t>Bugfixed</a:t>
+                      </a:r>
+                      <a:r>
+                        <a:rPr lang="de-DE" sz="1800" baseline="0" dirty="0" smtClean="0">
+                          <a:solidFill>
+                            <a:schemeClr val="tx1"/>
+                          </a:solidFill>
+                        </a:rPr>
+                        <a:t> </a:t>
+                      </a:r>
+                      <a:r>
+                        <a:rPr lang="de-DE" sz="1800" baseline="0" dirty="0" err="1" smtClean="0">
+                          <a:solidFill>
+                            <a:schemeClr val="tx1"/>
+                          </a:solidFill>
+                        </a:rPr>
+                        <a:t>fly-physics</a:t>
+                      </a:r>
+                      <a:r>
+                        <a:rPr lang="de-DE" sz="1800" baseline="0" dirty="0" smtClean="0">
+                          <a:solidFill>
+                            <a:schemeClr val="tx1"/>
+                          </a:solidFill>
+                        </a:rPr>
+                        <a:t> </a:t>
+                      </a:r>
+                      <a:r>
+                        <a:rPr lang="de-DE" sz="1800" baseline="0" dirty="0" err="1" smtClean="0">
+                          <a:solidFill>
+                            <a:schemeClr val="tx1"/>
+                          </a:solidFill>
+                        </a:rPr>
+                        <a:t>issues</a:t>
+                      </a:r>
+                      <a:endParaRPr lang="de-DE" sz="1800" baseline="0" dirty="0" smtClean="0">
+                        <a:solidFill>
+                          <a:schemeClr val="tx1"/>
+                        </a:solidFill>
+                      </a:endParaRPr>
                     </a:p>
                   </a:txBody>
                   <a:tcPr/>
@@ -13470,7 +14659,7 @@
                   <a:tcPr/>
                 </a:tc>
               </a:tr>
-              <a:tr h="1032428">
+              <a:tr h="1433656">
                 <a:tc>
                   <a:txBody>
                     <a:bodyPr/>
@@ -13601,7 +14790,53 @@
                     <a:bodyPr/>
                     <a:lstStyle/>
                     <a:p>
-                      <a:endParaRPr lang="de-DE"/>
+                      <a:pPr lvl="0">
+                        <a:buFont typeface="Arial" pitchFamily="34" charset="0"/>
+                        <a:buChar char="•"/>
+                      </a:pPr>
+                      <a:r>
+                        <a:rPr lang="de-DE" sz="1800" dirty="0" smtClean="0">
+                          <a:solidFill>
+                            <a:schemeClr val="tx1"/>
+                          </a:solidFill>
+                        </a:rPr>
+                        <a:t> Bugfixin</a:t>
+                      </a:r>
+                      <a:r>
+                        <a:rPr lang="de-DE" sz="1800" baseline="0" dirty="0" smtClean="0">
+                          <a:solidFill>
+                            <a:schemeClr val="tx1"/>
+                          </a:solidFill>
+                        </a:rPr>
+                        <a:t>g</a:t>
+                      </a:r>
+                    </a:p>
+                    <a:p>
+                      <a:pPr lvl="0">
+                        <a:buFont typeface="Arial" pitchFamily="34" charset="0"/>
+                        <a:buChar char="•"/>
+                      </a:pPr>
+                      <a:r>
+                        <a:rPr lang="de-DE" sz="1800" baseline="0" dirty="0" smtClean="0">
+                          <a:solidFill>
+                            <a:schemeClr val="tx1"/>
+                          </a:solidFill>
+                        </a:rPr>
+                        <a:t> Error </a:t>
+                      </a:r>
+                      <a:r>
+                        <a:rPr lang="de-DE" sz="1800" baseline="0" dirty="0" err="1" smtClean="0">
+                          <a:solidFill>
+                            <a:schemeClr val="tx1"/>
+                          </a:solidFill>
+                        </a:rPr>
+                        <a:t>handling</a:t>
+                      </a:r>
+                      <a:endParaRPr lang="de-DE" sz="1800" baseline="0" dirty="0" smtClean="0">
+                        <a:solidFill>
+                          <a:schemeClr val="tx1"/>
+                        </a:solidFill>
+                      </a:endParaRPr>
                     </a:p>
                   </a:txBody>
                   <a:tcPr/>
@@ -13794,6 +15029,65 @@
                   <a:txBody>
                     <a:bodyPr/>
                     <a:lstStyle/>
+                    <a:p>
+                      <a:pPr lvl="0">
+                        <a:buFont typeface="Arial" pitchFamily="34" charset="0"/>
+                        <a:buChar char="•"/>
+                      </a:pPr>
+                      <a:r>
+                        <a:rPr lang="de-DE" sz="1800" dirty="0" smtClean="0">
+                          <a:solidFill>
+                            <a:schemeClr val="tx1"/>
+                          </a:solidFill>
+                        </a:rPr>
+                        <a:t> </a:t>
+                      </a:r>
+                      <a:r>
+                        <a:rPr lang="de-DE" sz="1800" dirty="0" err="1" smtClean="0">
+                          <a:solidFill>
+                            <a:schemeClr val="tx1"/>
+                          </a:solidFill>
+                        </a:rPr>
+                        <a:t>Thorough</a:t>
+                      </a:r>
+                      <a:r>
+                        <a:rPr lang="de-DE" sz="1800" dirty="0" smtClean="0">
+                          <a:solidFill>
+                            <a:schemeClr val="tx1"/>
+                          </a:solidFill>
+                        </a:rPr>
+                        <a:t> Fly-</a:t>
+                      </a:r>
+                      <a:r>
+                        <a:rPr lang="de-DE" sz="1800" dirty="0" err="1" smtClean="0">
+                          <a:solidFill>
+                            <a:schemeClr val="tx1"/>
+                          </a:solidFill>
+                        </a:rPr>
+                        <a:t>Physics</a:t>
+                      </a:r>
+                      <a:r>
+                        <a:rPr lang="de-DE" sz="1800" dirty="0" smtClean="0">
+                          <a:solidFill>
+                            <a:schemeClr val="tx1"/>
+                          </a:solidFill>
+                        </a:rPr>
+                        <a:t> </a:t>
+                      </a:r>
+                      <a:r>
+                        <a:rPr lang="de-DE" sz="1800" dirty="0" err="1" smtClean="0">
+                          <a:solidFill>
+                            <a:schemeClr val="tx1"/>
+                          </a:solidFill>
+                        </a:rPr>
+                        <a:t>tests</a:t>
+                      </a:r>
+                      <a:endParaRPr lang="de-DE" sz="1800" baseline="0" dirty="0" smtClean="0">
+                        <a:solidFill>
+                          <a:schemeClr val="tx1"/>
+                        </a:solidFill>
+                      </a:endParaRPr>
+                    </a:p>
                     <a:p>
                       <a:endParaRPr lang="de-DE" dirty="0"/>
                     </a:p>

</xml_diff>